<commit_message>
New jupyter notebook for refactored EDA cleaning process. Results in better ML models. readme updated, presentation updated, new better golden database.
</commit_message>
<xml_diff>
--- a/Project 3 Presentation.pptx
+++ b/Project 3 Presentation.pptx
@@ -537,7 +537,7 @@
           <a:p>
             <a:fld id="{17A59452-5D19-4F38-84DD-02F5AB9175C0}" type="datetimeFigureOut">
               <a:rPr lang="en-US" smtClean="0"/>
-              <a:t>5/7/2019</a:t>
+              <a:t>5/8/2019</a:t>
             </a:fld>
             <a:endParaRPr lang="en-US"/>
           </a:p>
@@ -749,7 +749,7 @@
           <a:p>
             <a:fld id="{17A59452-5D19-4F38-84DD-02F5AB9175C0}" type="datetimeFigureOut">
               <a:rPr lang="en-US" smtClean="0"/>
-              <a:t>5/7/2019</a:t>
+              <a:t>5/8/2019</a:t>
             </a:fld>
             <a:endParaRPr lang="en-US"/>
           </a:p>
@@ -936,7 +936,7 @@
           <a:p>
             <a:fld id="{17A59452-5D19-4F38-84DD-02F5AB9175C0}" type="datetimeFigureOut">
               <a:rPr lang="en-US" smtClean="0"/>
-              <a:t>5/7/2019</a:t>
+              <a:t>5/8/2019</a:t>
             </a:fld>
             <a:endParaRPr lang="en-US"/>
           </a:p>
@@ -1033,7 +1033,7 @@
           <a:p>
             <a:fld id="{17A59452-5D19-4F38-84DD-02F5AB9175C0}" type="datetimeFigureOut">
               <a:rPr lang="en-US" smtClean="0"/>
-              <a:t>5/7/2019</a:t>
+              <a:t>5/8/2019</a:t>
             </a:fld>
             <a:endParaRPr lang="en-US"/>
           </a:p>
@@ -1629,7 +1629,7 @@
           <a:p>
             <a:fld id="{17A59452-5D19-4F38-84DD-02F5AB9175C0}" type="datetimeFigureOut">
               <a:rPr lang="en-US" smtClean="0"/>
-              <a:t>5/7/2019</a:t>
+              <a:t>5/8/2019</a:t>
             </a:fld>
             <a:endParaRPr lang="en-US"/>
           </a:p>
@@ -1726,7 +1726,7 @@
           <a:p>
             <a:fld id="{17A59452-5D19-4F38-84DD-02F5AB9175C0}" type="datetimeFigureOut">
               <a:rPr lang="en-US" smtClean="0"/>
-              <a:t>5/7/2019</a:t>
+              <a:t>5/8/2019</a:t>
             </a:fld>
             <a:endParaRPr lang="en-US"/>
           </a:p>
@@ -2331,7 +2331,7 @@
           <a:p>
             <a:fld id="{17A59452-5D19-4F38-84DD-02F5AB9175C0}" type="datetimeFigureOut">
               <a:rPr lang="en-US" smtClean="0"/>
-              <a:t>5/7/2019</a:t>
+              <a:t>5/8/2019</a:t>
             </a:fld>
             <a:endParaRPr lang="en-US"/>
           </a:p>
@@ -2474,7 +2474,7 @@
           <a:p>
             <a:fld id="{17A59452-5D19-4F38-84DD-02F5AB9175C0}" type="datetimeFigureOut">
               <a:rPr lang="en-US" smtClean="0"/>
-              <a:t>5/7/2019</a:t>
+              <a:t>5/8/2019</a:t>
             </a:fld>
             <a:endParaRPr lang="en-US"/>
           </a:p>
@@ -2571,7 +2571,7 @@
           <a:p>
             <a:fld id="{17A59452-5D19-4F38-84DD-02F5AB9175C0}" type="datetimeFigureOut">
               <a:rPr lang="en-US" smtClean="0"/>
-              <a:t>5/7/2019</a:t>
+              <a:t>5/8/2019</a:t>
             </a:fld>
             <a:endParaRPr lang="en-US"/>
           </a:p>
@@ -2855,7 +2855,7 @@
           <a:p>
             <a:fld id="{17A59452-5D19-4F38-84DD-02F5AB9175C0}" type="datetimeFigureOut">
               <a:rPr lang="en-US" smtClean="0"/>
-              <a:t>5/7/2019</a:t>
+              <a:t>5/8/2019</a:t>
             </a:fld>
             <a:endParaRPr lang="en-US"/>
           </a:p>
@@ -3377,7 +3377,7 @@
           <a:p>
             <a:fld id="{17A59452-5D19-4F38-84DD-02F5AB9175C0}" type="datetimeFigureOut">
               <a:rPr lang="en-US" smtClean="0"/>
-              <a:t>5/7/2019</a:t>
+              <a:t>5/8/2019</a:t>
             </a:fld>
             <a:endParaRPr lang="en-US"/>
           </a:p>
@@ -3897,7 +3897,7 @@
           <a:p>
             <a:fld id="{17A59452-5D19-4F38-84DD-02F5AB9175C0}" type="datetimeFigureOut">
               <a:rPr lang="en-US" smtClean="0"/>
-              <a:t>5/7/2019</a:t>
+              <a:t>5/8/2019</a:t>
             </a:fld>
             <a:endParaRPr lang="en-US"/>
           </a:p>
@@ -5392,7 +5392,7 @@
             <p:ph sz="quarter" idx="13"/>
             <p:extLst>
               <p:ext uri="{D42A27DB-BD31-4B8C-83A1-F6EECF244321}">
-                <p14:modId xmlns:p14="http://schemas.microsoft.com/office/powerpoint/2010/main" val="1427815400"/>
+                <p14:modId xmlns:p14="http://schemas.microsoft.com/office/powerpoint/2010/main" val="66455081"/>
               </p:ext>
             </p:extLst>
           </p:nvPr>
@@ -5501,6 +5501,204 @@
                         </a:solidFill>
                         <a:effectLst/>
                         <a:latin typeface="Calibri"/>
+                      </a:endParaRPr>
+                    </a:p>
+                  </a:txBody>
+                  <a:tcPr marL="7620" marR="7620" marT="7620" marB="0" anchor="b"/>
+                </a:tc>
+              </a:tr>
+              <a:tr h="319088">
+                <a:tc>
+                  <a:txBody>
+                    <a:bodyPr/>
+                    <a:lstStyle/>
+                    <a:p>
+                      <a:pPr marL="0" algn="r" defTabSz="914400" rtl="0" eaLnBrk="1" fontAlgn="b" latinLnBrk="0" hangingPunct="1"/>
+                      <a:r>
+                        <a:rPr lang="en-US" sz="1400" u="none" strike="noStrike" kern="1200" dirty="0">
+                          <a:solidFill>
+                            <a:schemeClr val="dk1"/>
+                          </a:solidFill>
+                          <a:effectLst/>
+                          <a:latin typeface="+mn-lt"/>
+                          <a:ea typeface="+mn-ea"/>
+                          <a:cs typeface="+mn-cs"/>
+                        </a:rPr>
+                        <a:t>42</a:t>
+                      </a:r>
+                    </a:p>
+                  </a:txBody>
+                  <a:tcPr marL="7620" marR="7620" marT="7620" marB="0" anchor="b"/>
+                </a:tc>
+                <a:tc>
+                  <a:txBody>
+                    <a:bodyPr/>
+                    <a:lstStyle/>
+                    <a:p>
+                      <a:pPr marL="0" algn="ctr" defTabSz="914400" rtl="0" eaLnBrk="1" fontAlgn="b" latinLnBrk="0" hangingPunct="1"/>
+                      <a:r>
+                        <a:rPr lang="en-US" sz="1400" u="none" strike="noStrike" kern="1200" dirty="0">
+                          <a:solidFill>
+                            <a:schemeClr val="dk1"/>
+                          </a:solidFill>
+                          <a:effectLst/>
+                          <a:latin typeface="+mn-lt"/>
+                          <a:ea typeface="+mn-ea"/>
+                          <a:cs typeface="+mn-cs"/>
+                        </a:rPr>
+                        <a:t>Random Forest (2000)</a:t>
+                      </a:r>
+                    </a:p>
+                  </a:txBody>
+                  <a:tcPr marL="7620" marR="7620" marT="7620" marB="0" anchor="b"/>
+                </a:tc>
+                <a:tc>
+                  <a:txBody>
+                    <a:bodyPr/>
+                    <a:lstStyle/>
+                    <a:p>
+                      <a:pPr marL="0" algn="r" defTabSz="914400" rtl="0" eaLnBrk="1" fontAlgn="b" latinLnBrk="0" hangingPunct="1"/>
+                      <a:r>
+                        <a:rPr lang="en-US" sz="1400" u="none" strike="noStrike" kern="1200" dirty="0">
+                          <a:solidFill>
+                            <a:schemeClr val="dk1"/>
+                          </a:solidFill>
+                          <a:effectLst/>
+                          <a:latin typeface="+mn-lt"/>
+                          <a:ea typeface="+mn-ea"/>
+                          <a:cs typeface="+mn-cs"/>
+                        </a:rPr>
+                        <a:t>0.647</a:t>
+                      </a:r>
+                    </a:p>
+                  </a:txBody>
+                  <a:tcPr marL="7620" marR="7620" marT="7620" marB="0" anchor="b"/>
+                </a:tc>
+                <a:tc>
+                  <a:txBody>
+                    <a:bodyPr/>
+                    <a:lstStyle/>
+                    <a:p>
+                      <a:pPr marL="0" algn="r" defTabSz="914400" rtl="0" eaLnBrk="1" fontAlgn="b" latinLnBrk="0" hangingPunct="1"/>
+                      <a:r>
+                        <a:rPr lang="en-US" sz="1400" u="none" strike="noStrike" kern="1200" dirty="0" smtClean="0">
+                          <a:solidFill>
+                            <a:schemeClr val="dk1"/>
+                          </a:solidFill>
+                          <a:effectLst/>
+                          <a:latin typeface="+mn-lt"/>
+                          <a:ea typeface="+mn-ea"/>
+                          <a:cs typeface="+mn-cs"/>
+                        </a:rPr>
+                        <a:t>52.33 </a:t>
+                      </a:r>
+                      <a:endParaRPr lang="en-US" sz="1400" u="none" strike="noStrike" kern="1200" dirty="0">
+                        <a:solidFill>
+                          <a:schemeClr val="dk1"/>
+                        </a:solidFill>
+                        <a:effectLst/>
+                        <a:latin typeface="+mn-lt"/>
+                        <a:ea typeface="+mn-ea"/>
+                        <a:cs typeface="+mn-cs"/>
+                      </a:endParaRPr>
+                    </a:p>
+                  </a:txBody>
+                  <a:tcPr marL="7620" marR="7620" marT="7620" marB="0" anchor="b"/>
+                </a:tc>
+              </a:tr>
+              <a:tr h="319088">
+                <a:tc>
+                  <a:txBody>
+                    <a:bodyPr/>
+                    <a:lstStyle/>
+                    <a:p>
+                      <a:pPr marL="0" algn="r" defTabSz="914400" rtl="0" eaLnBrk="1" fontAlgn="b" latinLnBrk="0" hangingPunct="1"/>
+                      <a:r>
+                        <a:rPr lang="en-US" sz="1400" u="none" strike="noStrike" kern="1200">
+                          <a:solidFill>
+                            <a:schemeClr val="dk1"/>
+                          </a:solidFill>
+                          <a:effectLst/>
+                          <a:latin typeface="+mn-lt"/>
+                          <a:ea typeface="+mn-ea"/>
+                          <a:cs typeface="+mn-cs"/>
+                        </a:rPr>
+                        <a:t>41</a:t>
+                      </a:r>
+                    </a:p>
+                  </a:txBody>
+                  <a:tcPr marL="7620" marR="7620" marT="7620" marB="0" anchor="b"/>
+                </a:tc>
+                <a:tc>
+                  <a:txBody>
+                    <a:bodyPr/>
+                    <a:lstStyle/>
+                    <a:p>
+                      <a:pPr marL="0" algn="ctr" defTabSz="914400" rtl="0" eaLnBrk="1" fontAlgn="b" latinLnBrk="0" hangingPunct="1"/>
+                      <a:r>
+                        <a:rPr lang="en-US" sz="1400" u="none" strike="noStrike" kern="1200" dirty="0">
+                          <a:solidFill>
+                            <a:schemeClr val="dk1"/>
+                          </a:solidFill>
+                          <a:effectLst/>
+                          <a:latin typeface="+mn-lt"/>
+                          <a:ea typeface="+mn-ea"/>
+                          <a:cs typeface="+mn-cs"/>
+                        </a:rPr>
+                        <a:t>Linear Regression</a:t>
+                      </a:r>
+                    </a:p>
+                  </a:txBody>
+                  <a:tcPr marL="7620" marR="7620" marT="7620" marB="0" anchor="b"/>
+                </a:tc>
+                <a:tc>
+                  <a:txBody>
+                    <a:bodyPr/>
+                    <a:lstStyle/>
+                    <a:p>
+                      <a:pPr marL="0" algn="r" defTabSz="914400" rtl="0" eaLnBrk="1" fontAlgn="b" latinLnBrk="0" hangingPunct="1"/>
+                      <a:r>
+                        <a:rPr lang="en-US" sz="1400" u="none" strike="noStrike" kern="1200" dirty="0">
+                          <a:solidFill>
+                            <a:schemeClr val="dk1"/>
+                          </a:solidFill>
+                          <a:effectLst/>
+                          <a:latin typeface="+mn-lt"/>
+                          <a:ea typeface="+mn-ea"/>
+                          <a:cs typeface="+mn-cs"/>
+                        </a:rPr>
+                        <a:t>0.620</a:t>
+                      </a:r>
+                    </a:p>
+                  </a:txBody>
+                  <a:tcPr marL="7620" marR="7620" marT="7620" marB="0" anchor="b"/>
+                </a:tc>
+                <a:tc>
+                  <a:txBody>
+                    <a:bodyPr/>
+                    <a:lstStyle/>
+                    <a:p>
+                      <a:pPr marL="0" algn="r" defTabSz="914400" rtl="0" eaLnBrk="1" fontAlgn="b" latinLnBrk="0" hangingPunct="1"/>
+                      <a:r>
+                        <a:rPr lang="en-US" sz="1400" u="none" strike="noStrike" kern="1200" dirty="0" smtClean="0">
+                          <a:solidFill>
+                            <a:schemeClr val="dk1"/>
+                          </a:solidFill>
+                          <a:effectLst/>
+                          <a:latin typeface="+mn-lt"/>
+                          <a:ea typeface="+mn-ea"/>
+                          <a:cs typeface="+mn-cs"/>
+                        </a:rPr>
+                        <a:t>53.25 </a:t>
+                      </a:r>
+                      <a:endParaRPr lang="en-US" sz="1400" u="none" strike="noStrike" kern="1200" dirty="0">
+                        <a:solidFill>
+                          <a:schemeClr val="dk1"/>
+                        </a:solidFill>
+                        <a:effectLst/>
+                        <a:latin typeface="+mn-lt"/>
+                        <a:ea typeface="+mn-ea"/>
+                        <a:cs typeface="+mn-cs"/>
                       </a:endParaRPr>
                     </a:p>
                   </a:txBody>
@@ -5655,12 +5853,12 @@
                     <a:p>
                       <a:pPr algn="r" fontAlgn="b"/>
                       <a:r>
-                        <a:rPr lang="en-US" sz="1400" u="none" strike="noStrike">
+                        <a:rPr lang="en-US" sz="1400" u="none" strike="noStrike" dirty="0">
                           <a:effectLst/>
                         </a:rPr>
                         <a:t>0.552</a:t>
                       </a:r>
-                      <a:endParaRPr lang="en-US" sz="1400" b="0" i="0" u="none" strike="noStrike">
+                      <a:endParaRPr lang="en-US" sz="1400" b="0" i="0" u="none" strike="noStrike" dirty="0">
                         <a:solidFill>
                           <a:srgbClr val="000000"/>
                         </a:solidFill>
@@ -6643,200 +6841,16 @@
                     <a:p>
                       <a:pPr algn="r" fontAlgn="b"/>
                       <a:r>
-                        <a:rPr lang="en-US" sz="1400" u="none" strike="noStrike">
+                        <a:rPr lang="en-US" sz="1400" b="0" i="0" u="none" strike="noStrike" dirty="0" smtClean="0">
+                          <a:solidFill>
+                            <a:srgbClr val="000000"/>
+                          </a:solidFill>
                           <a:effectLst/>
+                          <a:latin typeface="Calibri"/>
                         </a:rPr>
-                        <a:t>12</a:t>
-                      </a:r>
-                      <a:endParaRPr lang="en-US" sz="1400" b="0" i="0" u="none" strike="noStrike">
-                        <a:solidFill>
-                          <a:srgbClr val="000000"/>
-                        </a:solidFill>
-                        <a:effectLst/>
-                        <a:latin typeface="Calibri"/>
-                      </a:endParaRPr>
-                    </a:p>
-                  </a:txBody>
-                  <a:tcPr marL="7620" marR="7620" marT="7620" marB="0" anchor="b"/>
-                </a:tc>
-                <a:tc>
-                  <a:txBody>
-                    <a:bodyPr/>
-                    <a:lstStyle/>
-                    <a:p>
-                      <a:pPr algn="ctr" fontAlgn="b"/>
-                      <a:r>
-                        <a:rPr lang="en-US" sz="1400" u="none" strike="noStrike" dirty="0">
-                          <a:effectLst/>
-                        </a:rPr>
-                        <a:t>Linear Regression</a:t>
+                        <a:t>1</a:t>
                       </a:r>
                       <a:endParaRPr lang="en-US" sz="1400" b="0" i="0" u="none" strike="noStrike" dirty="0">
-                        <a:solidFill>
-                          <a:srgbClr val="000000"/>
-                        </a:solidFill>
-                        <a:effectLst/>
-                        <a:latin typeface="Calibri"/>
-                      </a:endParaRPr>
-                    </a:p>
-                  </a:txBody>
-                  <a:tcPr marL="7620" marR="7620" marT="7620" marB="0" anchor="b"/>
-                </a:tc>
-                <a:tc>
-                  <a:txBody>
-                    <a:bodyPr/>
-                    <a:lstStyle/>
-                    <a:p>
-                      <a:pPr algn="r" fontAlgn="b"/>
-                      <a:r>
-                        <a:rPr lang="en-US" sz="1400" u="none" strike="noStrike">
-                          <a:effectLst/>
-                        </a:rPr>
-                        <a:t>0.405</a:t>
-                      </a:r>
-                      <a:endParaRPr lang="en-US" sz="1400" b="0" i="0" u="none" strike="noStrike">
-                        <a:solidFill>
-                          <a:srgbClr val="000000"/>
-                        </a:solidFill>
-                        <a:effectLst/>
-                        <a:latin typeface="Calibri"/>
-                      </a:endParaRPr>
-                    </a:p>
-                  </a:txBody>
-                  <a:tcPr marL="7620" marR="7620" marT="7620" marB="0" anchor="b"/>
-                </a:tc>
-                <a:tc>
-                  <a:txBody>
-                    <a:bodyPr/>
-                    <a:lstStyle/>
-                    <a:p>
-                      <a:pPr algn="r" fontAlgn="b"/>
-                      <a:r>
-                        <a:rPr lang="en-US" sz="1400" u="none" strike="noStrike" dirty="0" smtClean="0">
-                          <a:effectLst/>
-                        </a:rPr>
-                        <a:t> 127.95 </a:t>
-                      </a:r>
-                      <a:endParaRPr lang="en-US" sz="1400" b="0" i="0" u="none" strike="noStrike" dirty="0">
-                        <a:solidFill>
-                          <a:srgbClr val="000000"/>
-                        </a:solidFill>
-                        <a:effectLst/>
-                        <a:latin typeface="Calibri"/>
-                      </a:endParaRPr>
-                    </a:p>
-                  </a:txBody>
-                  <a:tcPr marL="7620" marR="7620" marT="7620" marB="0" anchor="b"/>
-                </a:tc>
-              </a:tr>
-              <a:tr h="319088">
-                <a:tc>
-                  <a:txBody>
-                    <a:bodyPr/>
-                    <a:lstStyle/>
-                    <a:p>
-                      <a:pPr algn="r" fontAlgn="b"/>
-                      <a:r>
-                        <a:rPr lang="en-US" sz="1400" u="none" strike="noStrike">
-                          <a:effectLst/>
-                        </a:rPr>
-                        <a:t>20</a:t>
-                      </a:r>
-                      <a:endParaRPr lang="en-US" sz="1400" b="0" i="0" u="none" strike="noStrike">
-                        <a:solidFill>
-                          <a:srgbClr val="000000"/>
-                        </a:solidFill>
-                        <a:effectLst/>
-                        <a:latin typeface="Calibri"/>
-                      </a:endParaRPr>
-                    </a:p>
-                  </a:txBody>
-                  <a:tcPr marL="7620" marR="7620" marT="7620" marB="0" anchor="b"/>
-                </a:tc>
-                <a:tc>
-                  <a:txBody>
-                    <a:bodyPr/>
-                    <a:lstStyle/>
-                    <a:p>
-                      <a:pPr algn="ctr" fontAlgn="b"/>
-                      <a:r>
-                        <a:rPr lang="en-US" sz="1400" u="none" strike="noStrike" dirty="0">
-                          <a:effectLst/>
-                        </a:rPr>
-                        <a:t>Random Forest (2000)</a:t>
-                      </a:r>
-                      <a:endParaRPr lang="en-US" sz="1400" b="0" i="0" u="none" strike="noStrike" dirty="0">
-                        <a:solidFill>
-                          <a:srgbClr val="000000"/>
-                        </a:solidFill>
-                        <a:effectLst/>
-                        <a:latin typeface="Calibri"/>
-                      </a:endParaRPr>
-                    </a:p>
-                  </a:txBody>
-                  <a:tcPr marL="7620" marR="7620" marT="7620" marB="0" anchor="b"/>
-                </a:tc>
-                <a:tc>
-                  <a:txBody>
-                    <a:bodyPr/>
-                    <a:lstStyle/>
-                    <a:p>
-                      <a:pPr algn="r" fontAlgn="b"/>
-                      <a:r>
-                        <a:rPr lang="en-US" sz="1400" u="none" strike="noStrike">
-                          <a:effectLst/>
-                        </a:rPr>
-                        <a:t>0.358</a:t>
-                      </a:r>
-                      <a:endParaRPr lang="en-US" sz="1400" b="0" i="0" u="none" strike="noStrike">
-                        <a:solidFill>
-                          <a:srgbClr val="000000"/>
-                        </a:solidFill>
-                        <a:effectLst/>
-                        <a:latin typeface="Calibri"/>
-                      </a:endParaRPr>
-                    </a:p>
-                  </a:txBody>
-                  <a:tcPr marL="7620" marR="7620" marT="7620" marB="0" anchor="b"/>
-                </a:tc>
-                <a:tc>
-                  <a:txBody>
-                    <a:bodyPr/>
-                    <a:lstStyle/>
-                    <a:p>
-                      <a:pPr algn="r" fontAlgn="b"/>
-                      <a:r>
-                        <a:rPr lang="en-US" sz="1400" u="none" strike="noStrike" dirty="0" smtClean="0">
-                          <a:effectLst/>
-                        </a:rPr>
-                        <a:t>132.84 </a:t>
-                      </a:r>
-                      <a:endParaRPr lang="en-US" sz="1400" b="0" i="0" u="none" strike="noStrike" dirty="0">
-                        <a:solidFill>
-                          <a:srgbClr val="000000"/>
-                        </a:solidFill>
-                        <a:effectLst/>
-                        <a:latin typeface="Calibri"/>
-                      </a:endParaRPr>
-                    </a:p>
-                  </a:txBody>
-                  <a:tcPr marL="7620" marR="7620" marT="7620" marB="0" anchor="b"/>
-                </a:tc>
-              </a:tr>
-              <a:tr h="319088">
-                <a:tc>
-                  <a:txBody>
-                    <a:bodyPr/>
-                    <a:lstStyle/>
-                    <a:p>
-                      <a:pPr algn="r" fontAlgn="b"/>
-                      <a:r>
-                        <a:rPr lang="en-US" sz="1400" u="none" strike="noStrike">
-                          <a:effectLst/>
-                        </a:rPr>
-                        <a:t>0</a:t>
-                      </a:r>
-                      <a:endParaRPr lang="en-US" sz="1400" b="0" i="0" u="none" strike="noStrike">
                         <a:solidFill>
                           <a:srgbClr val="000000"/>
                         </a:solidFill>
@@ -7385,8 +7399,28 @@
             </a:r>
             <a:r>
               <a:rPr lang="en-US" dirty="0"/>
-              <a:t>day. It would be nice to explore other cities to see how much that matters as city contributed nothing as a variable.</a:t>
-            </a:r>
+              <a:t>day. It would be nice to explore other cities to see how much that matters as city contributed nothing as a variable</a:t>
+            </a:r>
+            <a:r>
+              <a:rPr lang="en-US" dirty="0" smtClean="0"/>
+              <a:t>.</a:t>
+            </a:r>
+          </a:p>
+          <a:p>
+            <a:pPr>
+              <a:buClrTx/>
+              <a:buFont typeface="Arial" pitchFamily="34" charset="0"/>
+              <a:buChar char="•"/>
+            </a:pPr>
+            <a:r>
+              <a:rPr lang="en-US" dirty="0" smtClean="0"/>
+              <a:t>A high error term which </a:t>
+            </a:r>
+            <a:r>
+              <a:rPr lang="en-US" smtClean="0"/>
+              <a:t>is concerning.</a:t>
+            </a:r>
+            <a:endParaRPr lang="en-US" dirty="0"/>
           </a:p>
           <a:p>
             <a:pPr marL="45720" indent="0">

</xml_diff>

<commit_message>
Attempted entire_home again on new improved ML. updated presentation and readme.
</commit_message>
<xml_diff>
--- a/Project 3 Presentation.pptx
+++ b/Project 3 Presentation.pptx
@@ -5392,7 +5392,7 @@
             <p:ph sz="quarter" idx="13"/>
             <p:extLst>
               <p:ext uri="{D42A27DB-BD31-4B8C-83A1-F6EECF244321}">
-                <p14:modId xmlns:p14="http://schemas.microsoft.com/office/powerpoint/2010/main" val="66455081"/>
+                <p14:modId xmlns:p14="http://schemas.microsoft.com/office/powerpoint/2010/main" val="4251365147"/>
               </p:ext>
             </p:extLst>
           </p:nvPr>
@@ -5711,6 +5711,123 @@
                     <a:bodyPr/>
                     <a:lstStyle/>
                     <a:p>
+                      <a:pPr marL="0" algn="r" defTabSz="914400" rtl="0" eaLnBrk="1" fontAlgn="b" latinLnBrk="0" hangingPunct="1"/>
+                      <a:r>
+                        <a:rPr lang="en-US" sz="1400" u="none" strike="noStrike" kern="1200" dirty="0" smtClean="0">
+                          <a:solidFill>
+                            <a:schemeClr val="dk1"/>
+                          </a:solidFill>
+                          <a:effectLst/>
+                          <a:latin typeface="+mn-lt"/>
+                          <a:ea typeface="+mn-ea"/>
+                          <a:cs typeface="+mn-cs"/>
+                        </a:rPr>
+                        <a:t>43</a:t>
+                      </a:r>
+                      <a:endParaRPr lang="en-US" sz="1400" u="none" strike="noStrike" kern="1200" dirty="0">
+                        <a:solidFill>
+                          <a:schemeClr val="dk1"/>
+                        </a:solidFill>
+                        <a:effectLst/>
+                        <a:latin typeface="+mn-lt"/>
+                        <a:ea typeface="+mn-ea"/>
+                        <a:cs typeface="+mn-cs"/>
+                      </a:endParaRPr>
+                    </a:p>
+                  </a:txBody>
+                  <a:tcPr marL="7620" marR="7620" marT="7620" marB="0" anchor="b"/>
+                </a:tc>
+                <a:tc>
+                  <a:txBody>
+                    <a:bodyPr/>
+                    <a:lstStyle/>
+                    <a:p>
+                      <a:pPr marL="0" algn="ctr" defTabSz="914400" rtl="0" eaLnBrk="1" fontAlgn="b" latinLnBrk="0" hangingPunct="1"/>
+                      <a:r>
+                        <a:rPr lang="en-US" sz="1400" u="none" strike="noStrike" kern="1200" dirty="0">
+                          <a:solidFill>
+                            <a:schemeClr val="dk1"/>
+                          </a:solidFill>
+                          <a:effectLst/>
+                          <a:latin typeface="+mn-lt"/>
+                          <a:ea typeface="+mn-ea"/>
+                          <a:cs typeface="+mn-cs"/>
+                        </a:rPr>
+                        <a:t>Random Forest (2000)</a:t>
+                      </a:r>
+                    </a:p>
+                  </a:txBody>
+                  <a:tcPr marL="7620" marR="7620" marT="7620" marB="0" anchor="b"/>
+                </a:tc>
+                <a:tc>
+                  <a:txBody>
+                    <a:bodyPr/>
+                    <a:lstStyle/>
+                    <a:p>
+                      <a:pPr marL="0" algn="r" defTabSz="914400" rtl="0" eaLnBrk="1" fontAlgn="b" latinLnBrk="0" hangingPunct="1"/>
+                      <a:r>
+                        <a:rPr lang="en-US" sz="1400" u="none" strike="noStrike" kern="1200" dirty="0" smtClean="0">
+                          <a:solidFill>
+                            <a:schemeClr val="dk1"/>
+                          </a:solidFill>
+                          <a:effectLst/>
+                          <a:latin typeface="+mn-lt"/>
+                          <a:ea typeface="+mn-ea"/>
+                          <a:cs typeface="+mn-cs"/>
+                        </a:rPr>
+                        <a:t>0.563</a:t>
+                      </a:r>
+                      <a:endParaRPr lang="en-US" sz="1400" u="none" strike="noStrike" kern="1200" dirty="0">
+                        <a:solidFill>
+                          <a:schemeClr val="dk1"/>
+                        </a:solidFill>
+                        <a:effectLst/>
+                        <a:latin typeface="+mn-lt"/>
+                        <a:ea typeface="+mn-ea"/>
+                        <a:cs typeface="+mn-cs"/>
+                      </a:endParaRPr>
+                    </a:p>
+                  </a:txBody>
+                  <a:tcPr marL="7620" marR="7620" marT="7620" marB="0" anchor="b"/>
+                </a:tc>
+                <a:tc>
+                  <a:txBody>
+                    <a:bodyPr/>
+                    <a:lstStyle/>
+                    <a:p>
+                      <a:pPr marL="0" algn="r" defTabSz="914400" rtl="0" eaLnBrk="1" fontAlgn="b" latinLnBrk="0" hangingPunct="1"/>
+                      <a:r>
+                        <a:rPr lang="en-US" sz="1400" u="none" strike="noStrike" kern="1200" dirty="0" smtClean="0">
+                          <a:solidFill>
+                            <a:schemeClr val="dk1"/>
+                          </a:solidFill>
+                          <a:effectLst/>
+                          <a:latin typeface="+mn-lt"/>
+                          <a:ea typeface="+mn-ea"/>
+                          <a:cs typeface="+mn-cs"/>
+                        </a:rPr>
+                        <a:t>61.39 </a:t>
+                      </a:r>
+                      <a:endParaRPr lang="en-US" sz="1400" u="none" strike="noStrike" kern="1200" dirty="0">
+                        <a:solidFill>
+                          <a:schemeClr val="dk1"/>
+                        </a:solidFill>
+                        <a:effectLst/>
+                        <a:latin typeface="+mn-lt"/>
+                        <a:ea typeface="+mn-ea"/>
+                        <a:cs typeface="+mn-cs"/>
+                      </a:endParaRPr>
+                    </a:p>
+                  </a:txBody>
+                  <a:tcPr marL="7620" marR="7620" marT="7620" marB="0" anchor="b"/>
+                </a:tc>
+              </a:tr>
+              <a:tr h="319088">
+                <a:tc>
+                  <a:txBody>
+                    <a:bodyPr/>
+                    <a:lstStyle/>
+                    <a:p>
                       <a:pPr algn="r" fontAlgn="b"/>
                       <a:r>
                         <a:rPr lang="en-US" sz="1400" u="none" strike="noStrike" dirty="0">
@@ -5759,12 +5876,12 @@
                     <a:p>
                       <a:pPr algn="r" fontAlgn="b"/>
                       <a:r>
-                        <a:rPr lang="en-US" sz="1400" u="none" strike="noStrike">
+                        <a:rPr lang="en-US" sz="1400" u="none" strike="noStrike" dirty="0">
                           <a:effectLst/>
                         </a:rPr>
                         <a:t>0.553</a:t>
                       </a:r>
-                      <a:endParaRPr lang="en-US" sz="1400" b="0" i="0" u="none" strike="noStrike">
+                      <a:endParaRPr lang="en-US" sz="1400" b="0" i="0" u="none" strike="noStrike" dirty="0">
                         <a:solidFill>
                           <a:srgbClr val="000000"/>
                         </a:solidFill>
@@ -5807,12 +5924,12 @@
                     <a:p>
                       <a:pPr algn="r" fontAlgn="b"/>
                       <a:r>
-                        <a:rPr lang="en-US" sz="1400" u="none" strike="noStrike">
+                        <a:rPr lang="en-US" sz="1400" u="none" strike="noStrike" dirty="0">
                           <a:effectLst/>
                         </a:rPr>
                         <a:t>25</a:t>
                       </a:r>
-                      <a:endParaRPr lang="en-US" sz="1400" b="0" i="0" u="none" strike="noStrike">
+                      <a:endParaRPr lang="en-US" sz="1400" b="0" i="0" u="none" strike="noStrike" dirty="0">
                         <a:solidFill>
                           <a:srgbClr val="000000"/>
                         </a:solidFill>
@@ -6747,100 +6864,6 @@
                     <a:p>
                       <a:pPr algn="r" fontAlgn="b"/>
                       <a:r>
-                        <a:rPr lang="en-US" sz="1400" u="none" strike="noStrike">
-                          <a:effectLst/>
-                        </a:rPr>
-                        <a:t>17</a:t>
-                      </a:r>
-                      <a:endParaRPr lang="en-US" sz="1400" b="0" i="0" u="none" strike="noStrike">
-                        <a:solidFill>
-                          <a:srgbClr val="000000"/>
-                        </a:solidFill>
-                        <a:effectLst/>
-                        <a:latin typeface="Calibri"/>
-                      </a:endParaRPr>
-                    </a:p>
-                  </a:txBody>
-                  <a:tcPr marL="7620" marR="7620" marT="7620" marB="0" anchor="b"/>
-                </a:tc>
-                <a:tc>
-                  <a:txBody>
-                    <a:bodyPr/>
-                    <a:lstStyle/>
-                    <a:p>
-                      <a:pPr algn="ctr" fontAlgn="b"/>
-                      <a:r>
-                        <a:rPr lang="en-US" sz="1400" u="none" strike="noStrike" dirty="0">
-                          <a:effectLst/>
-                        </a:rPr>
-                        <a:t>Linear Regression</a:t>
-                      </a:r>
-                      <a:endParaRPr lang="en-US" sz="1400" b="0" i="0" u="none" strike="noStrike" dirty="0">
-                        <a:solidFill>
-                          <a:srgbClr val="000000"/>
-                        </a:solidFill>
-                        <a:effectLst/>
-                        <a:latin typeface="Calibri"/>
-                      </a:endParaRPr>
-                    </a:p>
-                  </a:txBody>
-                  <a:tcPr marL="7620" marR="7620" marT="7620" marB="0" anchor="b"/>
-                </a:tc>
-                <a:tc>
-                  <a:txBody>
-                    <a:bodyPr/>
-                    <a:lstStyle/>
-                    <a:p>
-                      <a:pPr algn="r" fontAlgn="b"/>
-                      <a:r>
-                        <a:rPr lang="en-US" sz="1400" u="none" strike="noStrike">
-                          <a:effectLst/>
-                        </a:rPr>
-                        <a:t>0.411</a:t>
-                      </a:r>
-                      <a:endParaRPr lang="en-US" sz="1400" b="0" i="0" u="none" strike="noStrike">
-                        <a:solidFill>
-                          <a:srgbClr val="000000"/>
-                        </a:solidFill>
-                        <a:effectLst/>
-                        <a:latin typeface="Calibri"/>
-                      </a:endParaRPr>
-                    </a:p>
-                  </a:txBody>
-                  <a:tcPr marL="7620" marR="7620" marT="7620" marB="0" anchor="b"/>
-                </a:tc>
-                <a:tc>
-                  <a:txBody>
-                    <a:bodyPr/>
-                    <a:lstStyle/>
-                    <a:p>
-                      <a:pPr algn="r" fontAlgn="b"/>
-                      <a:r>
-                        <a:rPr lang="en-US" sz="1400" u="none" strike="noStrike" dirty="0" smtClean="0">
-                          <a:effectLst/>
-                        </a:rPr>
-                        <a:t>127.12 </a:t>
-                      </a:r>
-                      <a:endParaRPr lang="en-US" sz="1400" b="0" i="0" u="none" strike="noStrike" dirty="0">
-                        <a:solidFill>
-                          <a:srgbClr val="000000"/>
-                        </a:solidFill>
-                        <a:effectLst/>
-                        <a:latin typeface="Calibri"/>
-                      </a:endParaRPr>
-                    </a:p>
-                  </a:txBody>
-                  <a:tcPr marL="7620" marR="7620" marT="7620" marB="0" anchor="b"/>
-                </a:tc>
-              </a:tr>
-              <a:tr h="319088">
-                <a:tc>
-                  <a:txBody>
-                    <a:bodyPr/>
-                    <a:lstStyle/>
-                    <a:p>
-                      <a:pPr algn="r" fontAlgn="b"/>
-                      <a:r>
                         <a:rPr lang="en-US" sz="1400" b="0" i="0" u="none" strike="noStrike" dirty="0" smtClean="0">
                           <a:solidFill>
                             <a:srgbClr val="000000"/>

</xml_diff>

<commit_message>
New best with .755! Add XGBoost, Visualizations, Deep Learning (needs work), Room rental exploration. Another visualization. Updated presentation. Updated results. Updated readme.
</commit_message>
<xml_diff>
--- a/Project 3 Presentation.pptx
+++ b/Project 3 Presentation.pptx
@@ -11,9 +11,10 @@
     <p:sldId id="256" r:id="rId5"/>
     <p:sldId id="259" r:id="rId6"/>
     <p:sldId id="264" r:id="rId7"/>
-    <p:sldId id="260" r:id="rId8"/>
-    <p:sldId id="261" r:id="rId9"/>
-    <p:sldId id="262" r:id="rId10"/>
+    <p:sldId id="265" r:id="rId8"/>
+    <p:sldId id="260" r:id="rId9"/>
+    <p:sldId id="261" r:id="rId10"/>
+    <p:sldId id="262" r:id="rId11"/>
   </p:sldIdLst>
   <p:sldSz cx="9144000" cy="6858000" type="screen4x3"/>
   <p:notesSz cx="6858000" cy="9144000"/>
@@ -4591,6 +4592,322 @@
 </p:sld>
 </file>
 
+<file path=ppt/slides/slide10.xml><?xml version="1.0" encoding="utf-8"?>
+<p:sld xmlns:a="http://schemas.openxmlformats.org/drawingml/2006/main" xmlns:r="http://schemas.openxmlformats.org/officeDocument/2006/relationships" xmlns:p="http://schemas.openxmlformats.org/presentationml/2006/main">
+  <p:cSld>
+    <p:spTree>
+      <p:nvGrpSpPr>
+        <p:cNvPr id="1" name=""/>
+        <p:cNvGrpSpPr/>
+        <p:nvPr/>
+      </p:nvGrpSpPr>
+      <p:grpSpPr>
+        <a:xfrm>
+          <a:off x="0" y="0"/>
+          <a:ext cx="0" cy="0"/>
+          <a:chOff x="0" y="0"/>
+          <a:chExt cx="0" cy="0"/>
+        </a:xfrm>
+      </p:grpSpPr>
+      <p:sp>
+        <p:nvSpPr>
+          <p:cNvPr id="2" name="Title 1"/>
+          <p:cNvSpPr>
+            <a:spLocks noGrp="1"/>
+          </p:cNvSpPr>
+          <p:nvPr>
+            <p:ph type="title"/>
+          </p:nvPr>
+        </p:nvSpPr>
+        <p:spPr>
+          <a:xfrm>
+            <a:off x="1295400" y="152400"/>
+            <a:ext cx="6512511" cy="1143000"/>
+          </a:xfrm>
+        </p:spPr>
+        <p:txBody>
+          <a:bodyPr/>
+          <a:lstStyle/>
+          <a:p>
+            <a:pPr marL="0" indent="0" algn="ctr">
+              <a:buNone/>
+            </a:pPr>
+            <a:r>
+              <a:rPr lang="en-US" dirty="0" smtClean="0"/>
+              <a:t>Next Time</a:t>
+            </a:r>
+            <a:endParaRPr lang="en-US" dirty="0"/>
+          </a:p>
+        </p:txBody>
+      </p:sp>
+      <p:sp>
+        <p:nvSpPr>
+          <p:cNvPr id="3" name="Content Placeholder 2"/>
+          <p:cNvSpPr>
+            <a:spLocks noGrp="1"/>
+          </p:cNvSpPr>
+          <p:nvPr>
+            <p:ph sz="quarter" idx="13"/>
+          </p:nvPr>
+        </p:nvSpPr>
+        <p:spPr>
+          <a:xfrm>
+            <a:off x="914400" y="1371600"/>
+            <a:ext cx="7315200" cy="4724400"/>
+          </a:xfrm>
+        </p:spPr>
+        <p:txBody>
+          <a:bodyPr>
+            <a:normAutofit fontScale="77500" lnSpcReduction="20000"/>
+          </a:bodyPr>
+          <a:lstStyle/>
+          <a:p>
+            <a:pPr marL="45720" indent="0">
+              <a:buNone/>
+            </a:pPr>
+            <a:r>
+              <a:rPr lang="en-US" dirty="0"/>
+              <a:t>What I would do </a:t>
+            </a:r>
+            <a:r>
+              <a:rPr lang="en-US" dirty="0" smtClean="0"/>
+              <a:t>differently:</a:t>
+            </a:r>
+          </a:p>
+          <a:p>
+            <a:pPr>
+              <a:buClrTx/>
+              <a:buFont typeface="Arial" pitchFamily="34" charset="0"/>
+              <a:buChar char="•"/>
+            </a:pPr>
+            <a:r>
+              <a:rPr lang="en-US" dirty="0" smtClean="0"/>
+              <a:t>Test </a:t>
+            </a:r>
+            <a:r>
+              <a:rPr lang="en-US" dirty="0"/>
+              <a:t>PCA (Principal Component Analysis</a:t>
+            </a:r>
+            <a:r>
+              <a:rPr lang="en-US" dirty="0" smtClean="0"/>
+              <a:t>).</a:t>
+            </a:r>
+            <a:endParaRPr lang="en-US" dirty="0"/>
+          </a:p>
+          <a:p>
+            <a:pPr>
+              <a:buClrTx/>
+              <a:buFont typeface="Arial" pitchFamily="34" charset="0"/>
+              <a:buChar char="•"/>
+            </a:pPr>
+            <a:r>
+              <a:rPr lang="en-US" dirty="0" smtClean="0"/>
+              <a:t>Use </a:t>
+            </a:r>
+            <a:r>
+              <a:rPr lang="en-US" dirty="0"/>
+              <a:t>a more modern dataset from http://insideairbnb.com</a:t>
+            </a:r>
+            <a:r>
+              <a:rPr lang="en-US" dirty="0" smtClean="0"/>
+              <a:t>/.</a:t>
+            </a:r>
+            <a:endParaRPr lang="en-US" dirty="0"/>
+          </a:p>
+          <a:p>
+            <a:pPr>
+              <a:buClrTx/>
+              <a:buFont typeface="Arial" pitchFamily="34" charset="0"/>
+              <a:buChar char="•"/>
+            </a:pPr>
+            <a:r>
+              <a:rPr lang="en-US" dirty="0" smtClean="0"/>
+              <a:t>If </a:t>
+            </a:r>
+            <a:r>
+              <a:rPr lang="en-US" dirty="0"/>
+              <a:t>I had used </a:t>
+            </a:r>
+            <a:r>
+              <a:rPr lang="en-US" dirty="0" err="1"/>
+              <a:t>insiderairbnb</a:t>
+            </a:r>
+            <a:r>
+              <a:rPr lang="en-US" dirty="0"/>
+              <a:t> </a:t>
+            </a:r>
+            <a:r>
+              <a:rPr lang="en-US" dirty="0" smtClean="0"/>
+              <a:t>data, I </a:t>
+            </a:r>
+            <a:r>
+              <a:rPr lang="en-US" dirty="0"/>
+              <a:t>would have had more robust data like: reviews, calendars which allows me to set for cleanliness data and other factors hosts get rated </a:t>
+            </a:r>
+            <a:r>
+              <a:rPr lang="en-US" dirty="0" smtClean="0"/>
+              <a:t>on.</a:t>
+            </a:r>
+            <a:endParaRPr lang="en-US" dirty="0"/>
+          </a:p>
+          <a:p>
+            <a:pPr>
+              <a:buClrTx/>
+              <a:buFont typeface="Arial" pitchFamily="34" charset="0"/>
+              <a:buChar char="•"/>
+            </a:pPr>
+            <a:r>
+              <a:rPr lang="en-US" dirty="0" smtClean="0"/>
+              <a:t>There </a:t>
+            </a:r>
+            <a:r>
+              <a:rPr lang="en-US" dirty="0"/>
+              <a:t>is a definite opportunity to do NLP on reviews to see how better or worse reviews drive more price.</a:t>
+            </a:r>
+          </a:p>
+          <a:p>
+            <a:pPr>
+              <a:buClrTx/>
+              <a:buFont typeface="Arial" pitchFamily="34" charset="0"/>
+              <a:buChar char="•"/>
+            </a:pPr>
+            <a:r>
+              <a:rPr lang="en-US" dirty="0" smtClean="0"/>
+              <a:t>I </a:t>
+            </a:r>
+            <a:r>
+              <a:rPr lang="en-US" dirty="0"/>
+              <a:t>would add more visualizations (time restrictions, short project</a:t>
+            </a:r>
+            <a:r>
+              <a:rPr lang="en-US" dirty="0" smtClean="0"/>
+              <a:t>).</a:t>
+            </a:r>
+            <a:endParaRPr lang="en-US" dirty="0"/>
+          </a:p>
+          <a:p>
+            <a:pPr>
+              <a:buClrTx/>
+              <a:buFont typeface="Arial" pitchFamily="34" charset="0"/>
+              <a:buChar char="•"/>
+            </a:pPr>
+            <a:r>
+              <a:rPr lang="en-US" dirty="0" smtClean="0"/>
+              <a:t>Airbnb's </a:t>
+            </a:r>
+            <a:r>
+              <a:rPr lang="en-US" dirty="0"/>
+              <a:t>own </a:t>
+            </a:r>
+            <a:r>
+              <a:rPr lang="en-US" dirty="0" smtClean="0"/>
+              <a:t>conclusions </a:t>
+            </a:r>
+            <a:r>
+              <a:rPr lang="en-US" dirty="0"/>
+              <a:t>10 years ago were not </a:t>
+            </a:r>
+            <a:r>
+              <a:rPr lang="en-US" dirty="0" smtClean="0"/>
+              <a:t>surprising</a:t>
+            </a:r>
+            <a:r>
+              <a:rPr lang="en-US" dirty="0"/>
+              <a:t>: PHOTOS </a:t>
+            </a:r>
+            <a:r>
+              <a:rPr lang="en-US" dirty="0" err="1"/>
+              <a:t>PHOTOS</a:t>
+            </a:r>
+            <a:r>
+              <a:rPr lang="en-US" dirty="0"/>
+              <a:t> </a:t>
+            </a:r>
+            <a:r>
+              <a:rPr lang="en-US" dirty="0" err="1"/>
+              <a:t>PHOTOS</a:t>
+            </a:r>
+            <a:r>
+              <a:rPr lang="en-US" dirty="0"/>
+              <a:t>. I would attempt to build an image classifier to see what results might be based on listings' photos.</a:t>
+            </a:r>
+          </a:p>
+          <a:p>
+            <a:pPr>
+              <a:buClrTx/>
+              <a:buFont typeface="Arial" pitchFamily="34" charset="0"/>
+              <a:buChar char="•"/>
+            </a:pPr>
+            <a:r>
+              <a:rPr lang="en-US" dirty="0" smtClean="0"/>
+              <a:t>Deeper exploration into room rentals. </a:t>
+            </a:r>
+            <a:endParaRPr lang="en-US" dirty="0"/>
+          </a:p>
+          <a:p>
+            <a:pPr>
+              <a:buClrTx/>
+              <a:buFont typeface="Arial" pitchFamily="34" charset="0"/>
+              <a:buChar char="•"/>
+            </a:pPr>
+            <a:r>
+              <a:rPr lang="en-US" dirty="0" smtClean="0"/>
+              <a:t>This </a:t>
+            </a:r>
+            <a:r>
+              <a:rPr lang="en-US" dirty="0"/>
+              <a:t>dataset was solely DC and </a:t>
+            </a:r>
+            <a:r>
+              <a:rPr lang="en-US" dirty="0" smtClean="0"/>
+              <a:t>one </a:t>
+            </a:r>
+            <a:r>
+              <a:rPr lang="en-US" dirty="0"/>
+              <a:t>day. It would be nice to explore other cities to see how much that matters as city contributed nothing as a variable</a:t>
+            </a:r>
+            <a:r>
+              <a:rPr lang="en-US" dirty="0" smtClean="0"/>
+              <a:t>.</a:t>
+            </a:r>
+          </a:p>
+          <a:p>
+            <a:pPr>
+              <a:buClrTx/>
+              <a:buFont typeface="Arial" pitchFamily="34" charset="0"/>
+              <a:buChar char="•"/>
+            </a:pPr>
+            <a:r>
+              <a:rPr lang="en-US" dirty="0" smtClean="0"/>
+              <a:t>A high error term which </a:t>
+            </a:r>
+            <a:r>
+              <a:rPr lang="en-US" smtClean="0"/>
+              <a:t>is concerning.</a:t>
+            </a:r>
+            <a:endParaRPr lang="en-US" dirty="0"/>
+          </a:p>
+          <a:p>
+            <a:pPr marL="45720" indent="0">
+              <a:buNone/>
+            </a:pPr>
+            <a:endParaRPr lang="en-US" dirty="0"/>
+          </a:p>
+        </p:txBody>
+      </p:sp>
+    </p:spTree>
+    <p:extLst>
+      <p:ext uri="{BB962C8B-B14F-4D97-AF65-F5344CB8AC3E}">
+        <p14:creationId xmlns:p14="http://schemas.microsoft.com/office/powerpoint/2010/main" val="422100333"/>
+      </p:ext>
+    </p:extLst>
+  </p:cSld>
+  <p:clrMapOvr>
+    <a:masterClrMapping/>
+  </p:clrMapOvr>
+</p:sld>
+</file>
+
 <file path=ppt/slides/slide2.xml><?xml version="1.0" encoding="utf-8"?>
 <p:sld xmlns:a="http://schemas.openxmlformats.org/drawingml/2006/main" xmlns:r="http://schemas.openxmlformats.org/officeDocument/2006/relationships" xmlns:p="http://schemas.openxmlformats.org/presentationml/2006/main">
   <p:cSld>
@@ -5351,6 +5668,65 @@
           <a:chExt cx="0" cy="0"/>
         </a:xfrm>
       </p:grpSpPr>
+      <p:pic>
+        <p:nvPicPr>
+          <p:cNvPr id="4" name="Content Placeholder 3"/>
+          <p:cNvPicPr>
+            <a:picLocks noGrp="1" noChangeAspect="1"/>
+          </p:cNvPicPr>
+          <p:nvPr>
+            <p:ph sz="quarter" idx="13"/>
+          </p:nvPr>
+        </p:nvPicPr>
+        <p:blipFill>
+          <a:blip r:embed="rId2">
+            <a:extLst>
+              <a:ext uri="{28A0092B-C50C-407E-A947-70E740481C1C}">
+                <a14:useLocalDpi xmlns:a14="http://schemas.microsoft.com/office/drawing/2010/main" val="0"/>
+              </a:ext>
+            </a:extLst>
+          </a:blip>
+          <a:stretch>
+            <a:fillRect/>
+          </a:stretch>
+        </p:blipFill>
+        <p:spPr>
+          <a:xfrm>
+            <a:off x="533400" y="869156"/>
+            <a:ext cx="8015288" cy="4693444"/>
+          </a:xfrm>
+        </p:spPr>
+      </p:pic>
+    </p:spTree>
+    <p:extLst>
+      <p:ext uri="{BB962C8B-B14F-4D97-AF65-F5344CB8AC3E}">
+        <p14:creationId xmlns:p14="http://schemas.microsoft.com/office/powerpoint/2010/main" val="1599179811"/>
+      </p:ext>
+    </p:extLst>
+  </p:cSld>
+  <p:clrMapOvr>
+    <a:masterClrMapping/>
+  </p:clrMapOvr>
+</p:sld>
+</file>
+
+<file path=ppt/slides/slide8.xml><?xml version="1.0" encoding="utf-8"?>
+<p:sld xmlns:a="http://schemas.openxmlformats.org/drawingml/2006/main" xmlns:r="http://schemas.openxmlformats.org/officeDocument/2006/relationships" xmlns:p="http://schemas.openxmlformats.org/presentationml/2006/main">
+  <p:cSld>
+    <p:spTree>
+      <p:nvGrpSpPr>
+        <p:cNvPr id="1" name=""/>
+        <p:cNvGrpSpPr/>
+        <p:nvPr/>
+      </p:nvGrpSpPr>
+      <p:grpSpPr>
+        <a:xfrm>
+          <a:off x="0" y="0"/>
+          <a:ext cx="0" cy="0"/>
+          <a:chOff x="0" y="0"/>
+          <a:chExt cx="0" cy="0"/>
+        </a:xfrm>
+      </p:grpSpPr>
       <p:sp>
         <p:nvSpPr>
           <p:cNvPr id="2" name="Title 1"/>
@@ -5392,7 +5768,7 @@
             <p:ph sz="quarter" idx="13"/>
             <p:extLst>
               <p:ext uri="{D42A27DB-BD31-4B8C-83A1-F6EECF244321}">
-                <p14:modId xmlns:p14="http://schemas.microsoft.com/office/powerpoint/2010/main" val="4251365147"/>
+                <p14:modId xmlns:p14="http://schemas.microsoft.com/office/powerpoint/2010/main" val="86360614"/>
               </p:ext>
             </p:extLst>
           </p:nvPr>
@@ -5501,6 +5877,144 @@
                         </a:solidFill>
                         <a:effectLst/>
                         <a:latin typeface="Calibri"/>
+                      </a:endParaRPr>
+                    </a:p>
+                  </a:txBody>
+                  <a:tcPr marL="7620" marR="7620" marT="7620" marB="0" anchor="b"/>
+                </a:tc>
+              </a:tr>
+              <a:tr h="319088">
+                <a:tc>
+                  <a:txBody>
+                    <a:bodyPr/>
+                    <a:lstStyle/>
+                    <a:p>
+                      <a:pPr marL="0" algn="r" defTabSz="914400" rtl="0" eaLnBrk="1" fontAlgn="b" latinLnBrk="0" hangingPunct="1"/>
+                      <a:r>
+                        <a:rPr lang="en-US" sz="1400" u="none" strike="noStrike" kern="1200" dirty="0" smtClean="0">
+                          <a:solidFill>
+                            <a:schemeClr val="dk1"/>
+                          </a:solidFill>
+                          <a:effectLst/>
+                          <a:latin typeface="+mn-lt"/>
+                          <a:ea typeface="+mn-ea"/>
+                          <a:cs typeface="+mn-cs"/>
+                        </a:rPr>
+                        <a:t>44</a:t>
+                      </a:r>
+                      <a:endParaRPr lang="en-US" sz="1400" u="none" strike="noStrike" kern="1200" dirty="0">
+                        <a:solidFill>
+                          <a:schemeClr val="dk1"/>
+                        </a:solidFill>
+                        <a:effectLst/>
+                        <a:latin typeface="+mn-lt"/>
+                        <a:ea typeface="+mn-ea"/>
+                        <a:cs typeface="+mn-cs"/>
+                      </a:endParaRPr>
+                    </a:p>
+                  </a:txBody>
+                  <a:tcPr marL="7620" marR="7620" marT="7620" marB="0" anchor="b"/>
+                </a:tc>
+                <a:tc>
+                  <a:txBody>
+                    <a:bodyPr/>
+                    <a:lstStyle/>
+                    <a:p>
+                      <a:pPr marL="0" algn="ctr" defTabSz="914400" rtl="0" eaLnBrk="1" fontAlgn="b" latinLnBrk="0" hangingPunct="1"/>
+                      <a:r>
+                        <a:rPr lang="en-US" sz="1400" u="none" strike="noStrike" kern="1200" dirty="0" err="1" smtClean="0">
+                          <a:solidFill>
+                            <a:schemeClr val="dk1"/>
+                          </a:solidFill>
+                          <a:effectLst/>
+                          <a:latin typeface="+mn-lt"/>
+                          <a:ea typeface="+mn-ea"/>
+                          <a:cs typeface="+mn-cs"/>
+                        </a:rPr>
+                        <a:t>XGBoost</a:t>
+                      </a:r>
+                      <a:r>
+                        <a:rPr lang="en-US" sz="1400" u="none" strike="noStrike" kern="1200" dirty="0" smtClean="0">
+                          <a:solidFill>
+                            <a:schemeClr val="dk1"/>
+                          </a:solidFill>
+                          <a:effectLst/>
+                          <a:latin typeface="+mn-lt"/>
+                          <a:ea typeface="+mn-ea"/>
+                          <a:cs typeface="+mn-cs"/>
+                        </a:rPr>
+                        <a:t> (100)</a:t>
+                      </a:r>
+                      <a:endParaRPr lang="en-US" sz="1400" u="none" strike="noStrike" kern="1200" dirty="0">
+                        <a:solidFill>
+                          <a:schemeClr val="dk1"/>
+                        </a:solidFill>
+                        <a:effectLst/>
+                        <a:latin typeface="+mn-lt"/>
+                        <a:ea typeface="+mn-ea"/>
+                        <a:cs typeface="+mn-cs"/>
+                      </a:endParaRPr>
+                    </a:p>
+                  </a:txBody>
+                  <a:tcPr marL="7620" marR="7620" marT="7620" marB="0" anchor="b"/>
+                </a:tc>
+                <a:tc>
+                  <a:txBody>
+                    <a:bodyPr/>
+                    <a:lstStyle/>
+                    <a:p>
+                      <a:pPr marL="0" algn="r" defTabSz="914400" rtl="0" eaLnBrk="1" fontAlgn="b" latinLnBrk="0" hangingPunct="1"/>
+                      <a:r>
+                        <a:rPr lang="en-US" sz="1400" u="none" strike="noStrike" kern="1200" dirty="0" smtClean="0">
+                          <a:solidFill>
+                            <a:schemeClr val="dk1"/>
+                          </a:solidFill>
+                          <a:effectLst/>
+                          <a:latin typeface="+mn-lt"/>
+                          <a:ea typeface="+mn-ea"/>
+                          <a:cs typeface="+mn-cs"/>
+                        </a:rPr>
+                        <a:t>0.755</a:t>
+                      </a:r>
+                      <a:endParaRPr lang="en-US" sz="1400" u="none" strike="noStrike" kern="1200" dirty="0">
+                        <a:solidFill>
+                          <a:schemeClr val="dk1"/>
+                        </a:solidFill>
+                        <a:effectLst/>
+                        <a:latin typeface="+mn-lt"/>
+                        <a:ea typeface="+mn-ea"/>
+                        <a:cs typeface="+mn-cs"/>
+                      </a:endParaRPr>
+                    </a:p>
+                  </a:txBody>
+                  <a:tcPr marL="7620" marR="7620" marT="7620" marB="0" anchor="b"/>
+                </a:tc>
+                <a:tc>
+                  <a:txBody>
+                    <a:bodyPr/>
+                    <a:lstStyle/>
+                    <a:p>
+                      <a:pPr marL="0" algn="r" defTabSz="914400" rtl="0" eaLnBrk="1" fontAlgn="b" latinLnBrk="0" hangingPunct="1"/>
+                      <a:r>
+                        <a:rPr lang="en-US" sz="1400" u="none" strike="noStrike" kern="1200" dirty="0" smtClean="0">
+                          <a:solidFill>
+                            <a:schemeClr val="dk1"/>
+                          </a:solidFill>
+                          <a:effectLst/>
+                          <a:latin typeface="+mn-lt"/>
+                          <a:ea typeface="+mn-ea"/>
+                          <a:cs typeface="+mn-cs"/>
+                        </a:rPr>
+                        <a:t>41.73</a:t>
+                      </a:r>
+                      <a:endParaRPr lang="en-US" sz="1400" u="none" strike="noStrike" kern="1200" dirty="0">
+                        <a:solidFill>
+                          <a:schemeClr val="dk1"/>
+                        </a:solidFill>
+                        <a:effectLst/>
+                        <a:latin typeface="+mn-lt"/>
+                        <a:ea typeface="+mn-ea"/>
+                        <a:cs typeface="+mn-cs"/>
                       </a:endParaRPr>
                     </a:p>
                   </a:txBody>
@@ -6770,100 +7284,6 @@
                     <a:p>
                       <a:pPr algn="r" fontAlgn="b"/>
                       <a:r>
-                        <a:rPr lang="en-US" sz="1400" u="none" strike="noStrike">
-                          <a:effectLst/>
-                        </a:rPr>
-                        <a:t>18</a:t>
-                      </a:r>
-                      <a:endParaRPr lang="en-US" sz="1400" b="0" i="0" u="none" strike="noStrike">
-                        <a:solidFill>
-                          <a:srgbClr val="000000"/>
-                        </a:solidFill>
-                        <a:effectLst/>
-                        <a:latin typeface="Calibri"/>
-                      </a:endParaRPr>
-                    </a:p>
-                  </a:txBody>
-                  <a:tcPr marL="7620" marR="7620" marT="7620" marB="0" anchor="b"/>
-                </a:tc>
-                <a:tc>
-                  <a:txBody>
-                    <a:bodyPr/>
-                    <a:lstStyle/>
-                    <a:p>
-                      <a:pPr algn="ctr" fontAlgn="b"/>
-                      <a:r>
-                        <a:rPr lang="en-US" sz="1400" u="none" strike="noStrike" dirty="0">
-                          <a:effectLst/>
-                        </a:rPr>
-                        <a:t>Linear Regression</a:t>
-                      </a:r>
-                      <a:endParaRPr lang="en-US" sz="1400" b="0" i="0" u="none" strike="noStrike" dirty="0">
-                        <a:solidFill>
-                          <a:srgbClr val="000000"/>
-                        </a:solidFill>
-                        <a:effectLst/>
-                        <a:latin typeface="Calibri"/>
-                      </a:endParaRPr>
-                    </a:p>
-                  </a:txBody>
-                  <a:tcPr marL="7620" marR="7620" marT="7620" marB="0" anchor="b"/>
-                </a:tc>
-                <a:tc>
-                  <a:txBody>
-                    <a:bodyPr/>
-                    <a:lstStyle/>
-                    <a:p>
-                      <a:pPr algn="r" fontAlgn="b"/>
-                      <a:r>
-                        <a:rPr lang="en-US" sz="1400" u="none" strike="noStrike">
-                          <a:effectLst/>
-                        </a:rPr>
-                        <a:t>0.420</a:t>
-                      </a:r>
-                      <a:endParaRPr lang="en-US" sz="1400" b="0" i="0" u="none" strike="noStrike">
-                        <a:solidFill>
-                          <a:srgbClr val="000000"/>
-                        </a:solidFill>
-                        <a:effectLst/>
-                        <a:latin typeface="Calibri"/>
-                      </a:endParaRPr>
-                    </a:p>
-                  </a:txBody>
-                  <a:tcPr marL="7620" marR="7620" marT="7620" marB="0" anchor="b"/>
-                </a:tc>
-                <a:tc>
-                  <a:txBody>
-                    <a:bodyPr/>
-                    <a:lstStyle/>
-                    <a:p>
-                      <a:pPr algn="r" fontAlgn="b"/>
-                      <a:r>
-                        <a:rPr lang="en-US" sz="1400" u="none" strike="noStrike" dirty="0" smtClean="0">
-                          <a:effectLst/>
-                        </a:rPr>
-                        <a:t>126.31 </a:t>
-                      </a:r>
-                      <a:endParaRPr lang="en-US" sz="1400" b="0" i="0" u="none" strike="noStrike" dirty="0">
-                        <a:solidFill>
-                          <a:srgbClr val="000000"/>
-                        </a:solidFill>
-                        <a:effectLst/>
-                        <a:latin typeface="Calibri"/>
-                      </a:endParaRPr>
-                    </a:p>
-                  </a:txBody>
-                  <a:tcPr marL="7620" marR="7620" marT="7620" marB="0" anchor="b"/>
-                </a:tc>
-              </a:tr>
-              <a:tr h="319088">
-                <a:tc>
-                  <a:txBody>
-                    <a:bodyPr/>
-                    <a:lstStyle/>
-                    <a:p>
-                      <a:pPr algn="r" fontAlgn="b"/>
-                      <a:r>
                         <a:rPr lang="en-US" sz="1400" b="0" i="0" u="none" strike="noStrike" dirty="0" smtClean="0">
                           <a:solidFill>
                             <a:srgbClr val="000000"/>
@@ -6971,185 +7391,6 @@
 </p:sld>
 </file>
 
-<file path=ppt/slides/slide8.xml><?xml version="1.0" encoding="utf-8"?>
-<p:sld xmlns:a="http://schemas.openxmlformats.org/drawingml/2006/main" xmlns:r="http://schemas.openxmlformats.org/officeDocument/2006/relationships" xmlns:p="http://schemas.openxmlformats.org/presentationml/2006/main">
-  <p:cSld>
-    <p:spTree>
-      <p:nvGrpSpPr>
-        <p:cNvPr id="1" name=""/>
-        <p:cNvGrpSpPr/>
-        <p:nvPr/>
-      </p:nvGrpSpPr>
-      <p:grpSpPr>
-        <a:xfrm>
-          <a:off x="0" y="0"/>
-          <a:ext cx="0" cy="0"/>
-          <a:chOff x="0" y="0"/>
-          <a:chExt cx="0" cy="0"/>
-        </a:xfrm>
-      </p:grpSpPr>
-      <p:sp>
-        <p:nvSpPr>
-          <p:cNvPr id="2" name="Title 1"/>
-          <p:cNvSpPr>
-            <a:spLocks noGrp="1"/>
-          </p:cNvSpPr>
-          <p:nvPr>
-            <p:ph type="title"/>
-          </p:nvPr>
-        </p:nvSpPr>
-        <p:spPr>
-          <a:xfrm>
-            <a:off x="1066800" y="381000"/>
-            <a:ext cx="6512511" cy="1143000"/>
-          </a:xfrm>
-        </p:spPr>
-        <p:txBody>
-          <a:bodyPr/>
-          <a:lstStyle/>
-          <a:p>
-            <a:pPr marL="0" indent="0">
-              <a:buNone/>
-            </a:pPr>
-            <a:r>
-              <a:rPr lang="en-US" dirty="0" smtClean="0"/>
-              <a:t>Conclusions</a:t>
-            </a:r>
-            <a:endParaRPr lang="en-US" dirty="0"/>
-          </a:p>
-        </p:txBody>
-      </p:sp>
-      <p:sp>
-        <p:nvSpPr>
-          <p:cNvPr id="3" name="Content Placeholder 2"/>
-          <p:cNvSpPr>
-            <a:spLocks noGrp="1"/>
-          </p:cNvSpPr>
-          <p:nvPr>
-            <p:ph sz="quarter" idx="13"/>
-          </p:nvPr>
-        </p:nvSpPr>
-        <p:spPr>
-          <a:xfrm>
-            <a:off x="1066800" y="1752600"/>
-            <a:ext cx="6400800" cy="3474720"/>
-          </a:xfrm>
-        </p:spPr>
-        <p:txBody>
-          <a:bodyPr>
-            <a:normAutofit lnSpcReduction="10000"/>
-          </a:bodyPr>
-          <a:lstStyle/>
-          <a:p>
-            <a:pPr marL="45720" indent="0">
-              <a:buClrTx/>
-              <a:buNone/>
-            </a:pPr>
-            <a:r>
-              <a:rPr lang="en-US" dirty="0"/>
-              <a:t>This dataset was the DC area. </a:t>
-            </a:r>
-          </a:p>
-          <a:p>
-            <a:pPr>
-              <a:buClrTx/>
-              <a:buFont typeface="Arial" pitchFamily="34" charset="0"/>
-              <a:buChar char="•"/>
-            </a:pPr>
-            <a:r>
-              <a:rPr lang="en-US" dirty="0" smtClean="0"/>
-              <a:t>Minimum </a:t>
-            </a:r>
-            <a:r>
-              <a:rPr lang="en-US" dirty="0"/>
-              <a:t>nights apparently has nothing to do with price.</a:t>
-            </a:r>
-          </a:p>
-          <a:p>
-            <a:pPr>
-              <a:buClrTx/>
-              <a:buFont typeface="Arial" pitchFamily="34" charset="0"/>
-              <a:buChar char="•"/>
-            </a:pPr>
-            <a:r>
-              <a:rPr lang="en-US" dirty="0" smtClean="0"/>
-              <a:t>Accommodates </a:t>
-            </a:r>
-            <a:r>
-              <a:rPr lang="en-US" dirty="0"/>
-              <a:t>is correlated with beds and bedrooms but it drives the price </a:t>
-            </a:r>
-            <a:r>
-              <a:rPr lang="en-US" dirty="0" smtClean="0"/>
-              <a:t>15% less</a:t>
-            </a:r>
-            <a:r>
-              <a:rPr lang="en-US" dirty="0"/>
-              <a:t>.</a:t>
-            </a:r>
-          </a:p>
-          <a:p>
-            <a:pPr>
-              <a:buClrTx/>
-              <a:buFont typeface="Arial" pitchFamily="34" charset="0"/>
-              <a:buChar char="•"/>
-            </a:pPr>
-            <a:r>
-              <a:rPr lang="en-US" dirty="0" smtClean="0"/>
-              <a:t>There </a:t>
-            </a:r>
-            <a:r>
-              <a:rPr lang="en-US" dirty="0"/>
-              <a:t>is definitely a chance to segment along entire homes </a:t>
-            </a:r>
-            <a:r>
-              <a:rPr lang="en-US" dirty="0" smtClean="0"/>
-              <a:t>versus </a:t>
-            </a:r>
-            <a:r>
-              <a:rPr lang="en-US" dirty="0"/>
-              <a:t>rooms.</a:t>
-            </a:r>
-          </a:p>
-          <a:p>
-            <a:pPr>
-              <a:buClrTx/>
-              <a:buFont typeface="Arial" pitchFamily="34" charset="0"/>
-              <a:buChar char="•"/>
-            </a:pPr>
-            <a:r>
-              <a:rPr lang="en-US" dirty="0" err="1" smtClean="0"/>
-              <a:t>Superhost</a:t>
-            </a:r>
-            <a:r>
-              <a:rPr lang="en-US" dirty="0" smtClean="0"/>
-              <a:t> </a:t>
-            </a:r>
-            <a:r>
-              <a:rPr lang="en-US" dirty="0"/>
-              <a:t>seems to matter and is worth testing more</a:t>
-            </a:r>
-            <a:r>
-              <a:rPr lang="en-US" dirty="0" smtClean="0"/>
-              <a:t>.</a:t>
-            </a:r>
-            <a:endParaRPr lang="en-US" dirty="0"/>
-          </a:p>
-        </p:txBody>
-      </p:sp>
-    </p:spTree>
-    <p:extLst>
-      <p:ext uri="{BB962C8B-B14F-4D97-AF65-F5344CB8AC3E}">
-        <p14:creationId xmlns:p14="http://schemas.microsoft.com/office/powerpoint/2010/main" val="201259363"/>
-      </p:ext>
-    </p:extLst>
-  </p:cSld>
-  <p:clrMapOvr>
-    <a:masterClrMapping/>
-  </p:clrMapOvr>
-</p:sld>
-</file>
-
 <file path=ppt/slides/slide9.xml><?xml version="1.0" encoding="utf-8"?>
 <p:sld xmlns:a="http://schemas.openxmlformats.org/drawingml/2006/main" xmlns:r="http://schemas.openxmlformats.org/officeDocument/2006/relationships" xmlns:p="http://schemas.openxmlformats.org/presentationml/2006/main">
   <p:cSld>
@@ -7179,7 +7420,7 @@
         </p:nvSpPr>
         <p:spPr>
           <a:xfrm>
-            <a:off x="1295400" y="152400"/>
+            <a:off x="1066800" y="381000"/>
             <a:ext cx="6512511" cy="1143000"/>
           </a:xfrm>
         </p:spPr>
@@ -7187,12 +7428,12 @@
           <a:bodyPr/>
           <a:lstStyle/>
           <a:p>
-            <a:pPr marL="0" indent="0" algn="ctr">
+            <a:pPr marL="0" indent="0">
               <a:buNone/>
             </a:pPr>
             <a:r>
               <a:rPr lang="en-US" dirty="0" smtClean="0"/>
-              <a:t>Next Time</a:t>
+              <a:t>Conclusions</a:t>
             </a:r>
             <a:endParaRPr lang="en-US" dirty="0"/>
           </a:p>
@@ -7210,26 +7451,23 @@
         </p:nvSpPr>
         <p:spPr>
           <a:xfrm>
-            <a:off x="914400" y="1371600"/>
-            <a:ext cx="7315200" cy="4724400"/>
+            <a:off x="1066800" y="1752600"/>
+            <a:ext cx="6400800" cy="3474720"/>
           </a:xfrm>
         </p:spPr>
         <p:txBody>
           <a:bodyPr>
-            <a:normAutofit fontScale="77500" lnSpcReduction="20000"/>
+            <a:normAutofit lnSpcReduction="10000"/>
           </a:bodyPr>
           <a:lstStyle/>
           <a:p>
             <a:pPr marL="45720" indent="0">
+              <a:buClrTx/>
               <a:buNone/>
             </a:pPr>
             <a:r>
               <a:rPr lang="en-US" dirty="0"/>
-              <a:t>What I would do </a:t>
-            </a:r>
-            <a:r>
-              <a:rPr lang="en-US" dirty="0" smtClean="0"/>
-              <a:t>differently:</a:t>
+              <a:t>This dataset was the DC area. </a:t>
             </a:r>
           </a:p>
           <a:p>
@@ -7240,17 +7478,12 @@
             </a:pPr>
             <a:r>
               <a:rPr lang="en-US" dirty="0" smtClean="0"/>
-              <a:t>Test </a:t>
+              <a:t>Minimum </a:t>
             </a:r>
             <a:r>
               <a:rPr lang="en-US" dirty="0"/>
-              <a:t>PCA (Principal Component Analysis</a:t>
-            </a:r>
-            <a:r>
-              <a:rPr lang="en-US" dirty="0" smtClean="0"/>
-              <a:t>).</a:t>
-            </a:r>
-            <a:endParaRPr lang="en-US" dirty="0"/>
+              <a:t>nights apparently has nothing to do with price.</a:t>
+            </a:r>
           </a:p>
           <a:p>
             <a:pPr>
@@ -7260,17 +7493,20 @@
             </a:pPr>
             <a:r>
               <a:rPr lang="en-US" dirty="0" smtClean="0"/>
-              <a:t>Use </a:t>
+              <a:t>Accommodates </a:t>
             </a:r>
             <a:r>
               <a:rPr lang="en-US" dirty="0"/>
-              <a:t>a more modern dataset from http://insideairbnb.com</a:t>
+              <a:t>is correlated with beds and bedrooms but it drives the price </a:t>
             </a:r>
             <a:r>
               <a:rPr lang="en-US" dirty="0" smtClean="0"/>
-              <a:t>/.</a:t>
-            </a:r>
-            <a:endParaRPr lang="en-US" dirty="0"/>
+              <a:t>15% less</a:t>
+            </a:r>
+            <a:r>
+              <a:rPr lang="en-US" dirty="0"/>
+              <a:t>.</a:t>
+            </a:r>
           </a:p>
           <a:p>
             <a:pPr>
@@ -7280,33 +7516,20 @@
             </a:pPr>
             <a:r>
               <a:rPr lang="en-US" dirty="0" smtClean="0"/>
-              <a:t>If </a:t>
+              <a:t>There </a:t>
             </a:r>
             <a:r>
               <a:rPr lang="en-US" dirty="0"/>
-              <a:t>I had used </a:t>
-            </a:r>
-            <a:r>
-              <a:rPr lang="en-US" dirty="0" err="1"/>
-              <a:t>insiderairbnb</a:t>
+              <a:t>is definitely a chance to segment along entire homes </a:t>
+            </a:r>
+            <a:r>
+              <a:rPr lang="en-US" dirty="0" smtClean="0"/>
+              <a:t>versus </a:t>
             </a:r>
             <a:r>
               <a:rPr lang="en-US" dirty="0"/>
-              <a:t> </a:t>
-            </a:r>
-            <a:r>
-              <a:rPr lang="en-US" dirty="0" smtClean="0"/>
-              <a:t>data, I </a:t>
-            </a:r>
-            <a:r>
-              <a:rPr lang="en-US" dirty="0"/>
-              <a:t>would have had more robust data like: reviews, calendars which allows me to set for cleanliness data and other factors hosts get rated </a:t>
-            </a:r>
-            <a:r>
-              <a:rPr lang="en-US" dirty="0" smtClean="0"/>
-              <a:t>on.</a:t>
-            </a:r>
-            <a:endParaRPr lang="en-US" dirty="0"/>
+              <a:t>rooms.</a:t>
+            </a:r>
           </a:p>
           <a:p>
             <a:pPr>
@@ -7315,140 +7538,21 @@
               <a:buChar char="•"/>
             </a:pPr>
             <a:r>
+              <a:rPr lang="en-US" dirty="0" err="1" smtClean="0"/>
+              <a:t>Superhost</a:t>
+            </a:r>
+            <a:r>
               <a:rPr lang="en-US" dirty="0" smtClean="0"/>
-              <a:t>There </a:t>
+              <a:t> </a:t>
             </a:r>
             <a:r>
               <a:rPr lang="en-US" dirty="0"/>
-              <a:t>is a definite opportunity to do NLP on reviews to see how better or worse reviews drive more price.</a:t>
-            </a:r>
-          </a:p>
-          <a:p>
-            <a:pPr>
-              <a:buClrTx/>
-              <a:buFont typeface="Arial" pitchFamily="34" charset="0"/>
-              <a:buChar char="•"/>
-            </a:pPr>
-            <a:r>
-              <a:rPr lang="en-US" dirty="0" smtClean="0"/>
-              <a:t>I </a:t>
-            </a:r>
-            <a:r>
-              <a:rPr lang="en-US" dirty="0"/>
-              <a:t>would add more visualizations (time restrictions, short project</a:t>
-            </a:r>
-            <a:r>
-              <a:rPr lang="en-US" dirty="0" smtClean="0"/>
-              <a:t>).</a:t>
-            </a:r>
-            <a:endParaRPr lang="en-US" dirty="0"/>
-          </a:p>
-          <a:p>
-            <a:pPr>
-              <a:buClrTx/>
-              <a:buFont typeface="Arial" pitchFamily="34" charset="0"/>
-              <a:buChar char="•"/>
-            </a:pPr>
-            <a:r>
-              <a:rPr lang="en-US" dirty="0" smtClean="0"/>
-              <a:t>Airbnb's </a:t>
-            </a:r>
-            <a:r>
-              <a:rPr lang="en-US" dirty="0"/>
-              <a:t>own </a:t>
-            </a:r>
-            <a:r>
-              <a:rPr lang="en-US" dirty="0" smtClean="0"/>
-              <a:t>conclusions </a:t>
-            </a:r>
-            <a:r>
-              <a:rPr lang="en-US" dirty="0"/>
-              <a:t>10 years ago were not </a:t>
-            </a:r>
-            <a:r>
-              <a:rPr lang="en-US" dirty="0" smtClean="0"/>
-              <a:t>surprising</a:t>
-            </a:r>
-            <a:r>
-              <a:rPr lang="en-US" dirty="0"/>
-              <a:t>: PHOTOS </a:t>
-            </a:r>
-            <a:r>
-              <a:rPr lang="en-US" dirty="0" err="1"/>
-              <a:t>PHOTOS</a:t>
-            </a:r>
-            <a:r>
-              <a:rPr lang="en-US" dirty="0"/>
-              <a:t> </a:t>
-            </a:r>
-            <a:r>
-              <a:rPr lang="en-US" dirty="0" err="1"/>
-              <a:t>PHOTOS</a:t>
-            </a:r>
-            <a:r>
-              <a:rPr lang="en-US" dirty="0"/>
-              <a:t>. I would attempt to build an image classifier to see what results might be based on listings' photos.</a:t>
-            </a:r>
-          </a:p>
-          <a:p>
-            <a:pPr>
-              <a:buClrTx/>
-              <a:buFont typeface="Arial" pitchFamily="34" charset="0"/>
-              <a:buChar char="•"/>
-            </a:pPr>
-            <a:r>
-              <a:rPr lang="en-US" dirty="0" smtClean="0"/>
-              <a:t>Deeper exploration into room rentals. </a:t>
-            </a:r>
-            <a:endParaRPr lang="en-US" dirty="0"/>
-          </a:p>
-          <a:p>
-            <a:pPr>
-              <a:buClrTx/>
-              <a:buFont typeface="Arial" pitchFamily="34" charset="0"/>
-              <a:buChar char="•"/>
-            </a:pPr>
-            <a:r>
-              <a:rPr lang="en-US" dirty="0" smtClean="0"/>
-              <a:t>This </a:t>
-            </a:r>
-            <a:r>
-              <a:rPr lang="en-US" dirty="0"/>
-              <a:t>dataset was solely DC and </a:t>
-            </a:r>
-            <a:r>
-              <a:rPr lang="en-US" dirty="0" smtClean="0"/>
-              <a:t>one </a:t>
-            </a:r>
-            <a:r>
-              <a:rPr lang="en-US" dirty="0"/>
-              <a:t>day. It would be nice to explore other cities to see how much that matters as city contributed nothing as a variable</a:t>
+              <a:t>seems to matter and is worth testing more</a:t>
             </a:r>
             <a:r>
               <a:rPr lang="en-US" dirty="0" smtClean="0"/>
               <a:t>.</a:t>
             </a:r>
-          </a:p>
-          <a:p>
-            <a:pPr>
-              <a:buClrTx/>
-              <a:buFont typeface="Arial" pitchFamily="34" charset="0"/>
-              <a:buChar char="•"/>
-            </a:pPr>
-            <a:r>
-              <a:rPr lang="en-US" dirty="0" smtClean="0"/>
-              <a:t>A high error term which </a:t>
-            </a:r>
-            <a:r>
-              <a:rPr lang="en-US" smtClean="0"/>
-              <a:t>is concerning.</a:t>
-            </a:r>
-            <a:endParaRPr lang="en-US" dirty="0"/>
-          </a:p>
-          <a:p>
-            <a:pPr marL="45720" indent="0">
-              <a:buNone/>
-            </a:pPr>
             <a:endParaRPr lang="en-US" dirty="0"/>
           </a:p>
         </p:txBody>
@@ -7456,7 +7560,7 @@
     </p:spTree>
     <p:extLst>
       <p:ext uri="{BB962C8B-B14F-4D97-AF65-F5344CB8AC3E}">
-        <p14:creationId xmlns:p14="http://schemas.microsoft.com/office/powerpoint/2010/main" val="422100333"/>
+        <p14:creationId xmlns:p14="http://schemas.microsoft.com/office/powerpoint/2010/main" val="201259363"/>
       </p:ext>
     </p:extLst>
   </p:cSld>

</xml_diff>

<commit_message>
Added KNN though it's useless, a few minor bug fixes, cleaned code, added Lasso(1&5), Ridge(1&5), ElasticNet(1&5), Fixed Deep Learning Network although it is also useless. Updated Results, Presentation and Readme.
</commit_message>
<xml_diff>
--- a/Project 3 Presentation.pptx
+++ b/Project 3 Presentation.pptx
@@ -5768,14 +5768,14 @@
             <p:ph sz="quarter" idx="13"/>
             <p:extLst>
               <p:ext uri="{D42A27DB-BD31-4B8C-83A1-F6EECF244321}">
-                <p14:modId xmlns:p14="http://schemas.microsoft.com/office/powerpoint/2010/main" val="86360614"/>
+                <p14:modId xmlns:p14="http://schemas.microsoft.com/office/powerpoint/2010/main" val="2166494765"/>
               </p:ext>
             </p:extLst>
           </p:nvPr>
         </p:nvGraphicFramePr>
         <p:xfrm>
           <a:off x="1143000" y="1066801"/>
-          <a:ext cx="6705600" cy="5448303"/>
+          <a:ext cx="6705600" cy="5410208"/>
         </p:xfrm>
         <a:graphic>
           <a:graphicData uri="http://schemas.openxmlformats.org/drawingml/2006/table">
@@ -6128,7 +6128,7 @@
                     <a:p>
                       <a:pPr marL="0" algn="r" defTabSz="914400" rtl="0" eaLnBrk="1" fontAlgn="b" latinLnBrk="0" hangingPunct="1"/>
                       <a:r>
-                        <a:rPr lang="en-US" sz="1400" u="none" strike="noStrike" kern="1200">
+                        <a:rPr lang="en-US" sz="1400" u="none" strike="noStrike" kern="1200" dirty="0">
                           <a:solidFill>
                             <a:schemeClr val="dk1"/>
                           </a:solidFill>
@@ -6204,6 +6204,624 @@
                           <a:cs typeface="+mn-cs"/>
                         </a:rPr>
                         <a:t>53.25 </a:t>
+                      </a:r>
+                      <a:endParaRPr lang="en-US" sz="1400" u="none" strike="noStrike" kern="1200" dirty="0">
+                        <a:solidFill>
+                          <a:schemeClr val="dk1"/>
+                        </a:solidFill>
+                        <a:effectLst/>
+                        <a:latin typeface="+mn-lt"/>
+                        <a:ea typeface="+mn-ea"/>
+                        <a:cs typeface="+mn-cs"/>
+                      </a:endParaRPr>
+                    </a:p>
+                  </a:txBody>
+                  <a:tcPr marL="7620" marR="7620" marT="7620" marB="0" anchor="b"/>
+                </a:tc>
+              </a:tr>
+              <a:tr h="319088">
+                <a:tc>
+                  <a:txBody>
+                    <a:bodyPr/>
+                    <a:lstStyle/>
+                    <a:p>
+                      <a:pPr marL="0" algn="r" defTabSz="914400" rtl="0" eaLnBrk="1" fontAlgn="b" latinLnBrk="0" hangingPunct="1"/>
+                      <a:r>
+                        <a:rPr lang="en-US" sz="1400" u="none" strike="noStrike" kern="1200" dirty="0">
+                          <a:solidFill>
+                            <a:schemeClr val="dk1"/>
+                          </a:solidFill>
+                          <a:effectLst/>
+                          <a:latin typeface="+mn-lt"/>
+                          <a:ea typeface="+mn-ea"/>
+                          <a:cs typeface="+mn-cs"/>
+                        </a:rPr>
+                        <a:t>45</a:t>
+                      </a:r>
+                    </a:p>
+                  </a:txBody>
+                  <a:tcPr marL="7620" marR="7620" marT="7620" marB="0" anchor="b"/>
+                </a:tc>
+                <a:tc>
+                  <a:txBody>
+                    <a:bodyPr/>
+                    <a:lstStyle/>
+                    <a:p>
+                      <a:pPr marL="0" algn="ctr" defTabSz="914400" rtl="0" eaLnBrk="1" fontAlgn="b" latinLnBrk="0" hangingPunct="1"/>
+                      <a:r>
+                        <a:rPr lang="en-US" sz="1400" u="none" strike="noStrike" kern="1200" dirty="0">
+                          <a:solidFill>
+                            <a:schemeClr val="dk1"/>
+                          </a:solidFill>
+                          <a:effectLst/>
+                          <a:latin typeface="+mn-lt"/>
+                          <a:ea typeface="+mn-ea"/>
+                          <a:cs typeface="+mn-cs"/>
+                        </a:rPr>
+                        <a:t>Lasso (a.01)</a:t>
+                      </a:r>
+                    </a:p>
+                  </a:txBody>
+                  <a:tcPr marL="7620" marR="7620" marT="7620" marB="0" anchor="b"/>
+                </a:tc>
+                <a:tc>
+                  <a:txBody>
+                    <a:bodyPr/>
+                    <a:lstStyle/>
+                    <a:p>
+                      <a:pPr marL="0" algn="r" defTabSz="914400" rtl="0" eaLnBrk="1" fontAlgn="b" latinLnBrk="0" hangingPunct="1"/>
+                      <a:r>
+                        <a:rPr lang="en-US" sz="1400" u="none" strike="noStrike" kern="1200">
+                          <a:solidFill>
+                            <a:schemeClr val="dk1"/>
+                          </a:solidFill>
+                          <a:effectLst/>
+                          <a:latin typeface="+mn-lt"/>
+                          <a:ea typeface="+mn-ea"/>
+                          <a:cs typeface="+mn-cs"/>
+                        </a:rPr>
+                        <a:t>0.616</a:t>
+                      </a:r>
+                    </a:p>
+                  </a:txBody>
+                  <a:tcPr marL="7620" marR="7620" marT="7620" marB="0" anchor="b"/>
+                </a:tc>
+                <a:tc>
+                  <a:txBody>
+                    <a:bodyPr/>
+                    <a:lstStyle/>
+                    <a:p>
+                      <a:pPr marL="0" algn="r" defTabSz="914400" rtl="0" eaLnBrk="1" fontAlgn="b" latinLnBrk="0" hangingPunct="1"/>
+                      <a:r>
+                        <a:rPr lang="en-US" sz="1400" u="none" strike="noStrike" kern="1200" dirty="0" smtClean="0">
+                          <a:solidFill>
+                            <a:schemeClr val="dk1"/>
+                          </a:solidFill>
+                          <a:effectLst/>
+                          <a:latin typeface="+mn-lt"/>
+                          <a:ea typeface="+mn-ea"/>
+                          <a:cs typeface="+mn-cs"/>
+                        </a:rPr>
+                        <a:t>49.60 </a:t>
+                      </a:r>
+                      <a:endParaRPr lang="en-US" sz="1400" u="none" strike="noStrike" kern="1200" dirty="0">
+                        <a:solidFill>
+                          <a:schemeClr val="dk1"/>
+                        </a:solidFill>
+                        <a:effectLst/>
+                        <a:latin typeface="+mn-lt"/>
+                        <a:ea typeface="+mn-ea"/>
+                        <a:cs typeface="+mn-cs"/>
+                      </a:endParaRPr>
+                    </a:p>
+                  </a:txBody>
+                  <a:tcPr marL="7620" marR="7620" marT="7620" marB="0" anchor="b"/>
+                </a:tc>
+              </a:tr>
+              <a:tr h="319088">
+                <a:tc>
+                  <a:txBody>
+                    <a:bodyPr/>
+                    <a:lstStyle/>
+                    <a:p>
+                      <a:pPr marL="0" algn="r" defTabSz="914400" rtl="0" eaLnBrk="1" fontAlgn="b" latinLnBrk="0" hangingPunct="1"/>
+                      <a:r>
+                        <a:rPr lang="en-US" sz="1400" u="none" strike="noStrike" kern="1200" dirty="0">
+                          <a:solidFill>
+                            <a:schemeClr val="dk1"/>
+                          </a:solidFill>
+                          <a:effectLst/>
+                          <a:latin typeface="+mn-lt"/>
+                          <a:ea typeface="+mn-ea"/>
+                          <a:cs typeface="+mn-cs"/>
+                        </a:rPr>
+                        <a:t>47</a:t>
+                      </a:r>
+                    </a:p>
+                  </a:txBody>
+                  <a:tcPr marL="7620" marR="7620" marT="7620" marB="0" anchor="b"/>
+                </a:tc>
+                <a:tc>
+                  <a:txBody>
+                    <a:bodyPr/>
+                    <a:lstStyle/>
+                    <a:p>
+                      <a:pPr marL="0" algn="ctr" defTabSz="914400" rtl="0" eaLnBrk="1" fontAlgn="b" latinLnBrk="0" hangingPunct="1"/>
+                      <a:r>
+                        <a:rPr lang="en-US" sz="1400" u="none" strike="noStrike" kern="1200" dirty="0">
+                          <a:solidFill>
+                            <a:schemeClr val="dk1"/>
+                          </a:solidFill>
+                          <a:effectLst/>
+                          <a:latin typeface="+mn-lt"/>
+                          <a:ea typeface="+mn-ea"/>
+                          <a:cs typeface="+mn-cs"/>
+                        </a:rPr>
+                        <a:t>Ridge (a.01)</a:t>
+                      </a:r>
+                    </a:p>
+                  </a:txBody>
+                  <a:tcPr marL="7620" marR="7620" marT="7620" marB="0" anchor="b"/>
+                </a:tc>
+                <a:tc>
+                  <a:txBody>
+                    <a:bodyPr/>
+                    <a:lstStyle/>
+                    <a:p>
+                      <a:pPr marL="0" algn="r" defTabSz="914400" rtl="0" eaLnBrk="1" fontAlgn="b" latinLnBrk="0" hangingPunct="1"/>
+                      <a:r>
+                        <a:rPr lang="en-US" sz="1400" u="none" strike="noStrike" kern="1200">
+                          <a:solidFill>
+                            <a:schemeClr val="dk1"/>
+                          </a:solidFill>
+                          <a:effectLst/>
+                          <a:latin typeface="+mn-lt"/>
+                          <a:ea typeface="+mn-ea"/>
+                          <a:cs typeface="+mn-cs"/>
+                        </a:rPr>
+                        <a:t>0.616</a:t>
+                      </a:r>
+                    </a:p>
+                  </a:txBody>
+                  <a:tcPr marL="7620" marR="7620" marT="7620" marB="0" anchor="b"/>
+                </a:tc>
+                <a:tc>
+                  <a:txBody>
+                    <a:bodyPr/>
+                    <a:lstStyle/>
+                    <a:p>
+                      <a:pPr marL="0" algn="r" defTabSz="914400" rtl="0" eaLnBrk="1" fontAlgn="b" latinLnBrk="0" hangingPunct="1"/>
+                      <a:r>
+                        <a:rPr lang="en-US" sz="1400" u="none" strike="noStrike" kern="1200" dirty="0" smtClean="0">
+                          <a:solidFill>
+                            <a:schemeClr val="dk1"/>
+                          </a:solidFill>
+                          <a:effectLst/>
+                          <a:latin typeface="+mn-lt"/>
+                          <a:ea typeface="+mn-ea"/>
+                          <a:cs typeface="+mn-cs"/>
+                        </a:rPr>
+                        <a:t>49.62 </a:t>
+                      </a:r>
+                      <a:endParaRPr lang="en-US" sz="1400" u="none" strike="noStrike" kern="1200" dirty="0">
+                        <a:solidFill>
+                          <a:schemeClr val="dk1"/>
+                        </a:solidFill>
+                        <a:effectLst/>
+                        <a:latin typeface="+mn-lt"/>
+                        <a:ea typeface="+mn-ea"/>
+                        <a:cs typeface="+mn-cs"/>
+                      </a:endParaRPr>
+                    </a:p>
+                  </a:txBody>
+                  <a:tcPr marL="7620" marR="7620" marT="7620" marB="0" anchor="b"/>
+                </a:tc>
+              </a:tr>
+              <a:tr h="319088">
+                <a:tc>
+                  <a:txBody>
+                    <a:bodyPr/>
+                    <a:lstStyle/>
+                    <a:p>
+                      <a:pPr marL="0" algn="r" defTabSz="914400" rtl="0" eaLnBrk="1" fontAlgn="b" latinLnBrk="0" hangingPunct="1"/>
+                      <a:r>
+                        <a:rPr lang="en-US" sz="1400" u="none" strike="noStrike" kern="1200">
+                          <a:solidFill>
+                            <a:schemeClr val="dk1"/>
+                          </a:solidFill>
+                          <a:effectLst/>
+                          <a:latin typeface="+mn-lt"/>
+                          <a:ea typeface="+mn-ea"/>
+                          <a:cs typeface="+mn-cs"/>
+                        </a:rPr>
+                        <a:t>48</a:t>
+                      </a:r>
+                    </a:p>
+                  </a:txBody>
+                  <a:tcPr marL="7620" marR="7620" marT="7620" marB="0" anchor="b"/>
+                </a:tc>
+                <a:tc>
+                  <a:txBody>
+                    <a:bodyPr/>
+                    <a:lstStyle/>
+                    <a:p>
+                      <a:pPr marL="0" algn="ctr" defTabSz="914400" rtl="0" eaLnBrk="1" fontAlgn="b" latinLnBrk="0" hangingPunct="1"/>
+                      <a:r>
+                        <a:rPr lang="en-US" sz="1400" u="none" strike="noStrike" kern="1200" dirty="0">
+                          <a:solidFill>
+                            <a:schemeClr val="dk1"/>
+                          </a:solidFill>
+                          <a:effectLst/>
+                          <a:latin typeface="+mn-lt"/>
+                          <a:ea typeface="+mn-ea"/>
+                          <a:cs typeface="+mn-cs"/>
+                        </a:rPr>
+                        <a:t>Ridge (a.05)</a:t>
+                      </a:r>
+                    </a:p>
+                  </a:txBody>
+                  <a:tcPr marL="7620" marR="7620" marT="7620" marB="0" anchor="b"/>
+                </a:tc>
+                <a:tc>
+                  <a:txBody>
+                    <a:bodyPr/>
+                    <a:lstStyle/>
+                    <a:p>
+                      <a:pPr marL="0" algn="r" defTabSz="914400" rtl="0" eaLnBrk="1" fontAlgn="b" latinLnBrk="0" hangingPunct="1"/>
+                      <a:r>
+                        <a:rPr lang="en-US" sz="1400" u="none" strike="noStrike" kern="1200">
+                          <a:solidFill>
+                            <a:schemeClr val="dk1"/>
+                          </a:solidFill>
+                          <a:effectLst/>
+                          <a:latin typeface="+mn-lt"/>
+                          <a:ea typeface="+mn-ea"/>
+                          <a:cs typeface="+mn-cs"/>
+                        </a:rPr>
+                        <a:t>0.616</a:t>
+                      </a:r>
+                    </a:p>
+                  </a:txBody>
+                  <a:tcPr marL="7620" marR="7620" marT="7620" marB="0" anchor="b"/>
+                </a:tc>
+                <a:tc>
+                  <a:txBody>
+                    <a:bodyPr/>
+                    <a:lstStyle/>
+                    <a:p>
+                      <a:pPr marL="0" algn="r" defTabSz="914400" rtl="0" eaLnBrk="1" fontAlgn="b" latinLnBrk="0" hangingPunct="1"/>
+                      <a:r>
+                        <a:rPr lang="en-US" sz="1400" u="none" strike="noStrike" kern="1200" dirty="0" smtClean="0">
+                          <a:solidFill>
+                            <a:schemeClr val="dk1"/>
+                          </a:solidFill>
+                          <a:effectLst/>
+                          <a:latin typeface="+mn-lt"/>
+                          <a:ea typeface="+mn-ea"/>
+                          <a:cs typeface="+mn-cs"/>
+                        </a:rPr>
+                        <a:t>49.64 </a:t>
+                      </a:r>
+                      <a:endParaRPr lang="en-US" sz="1400" u="none" strike="noStrike" kern="1200" dirty="0">
+                        <a:solidFill>
+                          <a:schemeClr val="dk1"/>
+                        </a:solidFill>
+                        <a:effectLst/>
+                        <a:latin typeface="+mn-lt"/>
+                        <a:ea typeface="+mn-ea"/>
+                        <a:cs typeface="+mn-cs"/>
+                      </a:endParaRPr>
+                    </a:p>
+                  </a:txBody>
+                  <a:tcPr marL="7620" marR="7620" marT="7620" marB="0" anchor="b"/>
+                </a:tc>
+              </a:tr>
+              <a:tr h="319088">
+                <a:tc>
+                  <a:txBody>
+                    <a:bodyPr/>
+                    <a:lstStyle/>
+                    <a:p>
+                      <a:pPr marL="0" algn="r" defTabSz="914400" rtl="0" eaLnBrk="1" fontAlgn="b" latinLnBrk="0" hangingPunct="1"/>
+                      <a:r>
+                        <a:rPr lang="en-US" sz="1400" u="none" strike="noStrike" kern="1200">
+                          <a:solidFill>
+                            <a:schemeClr val="dk1"/>
+                          </a:solidFill>
+                          <a:effectLst/>
+                          <a:latin typeface="+mn-lt"/>
+                          <a:ea typeface="+mn-ea"/>
+                          <a:cs typeface="+mn-cs"/>
+                        </a:rPr>
+                        <a:t>46</a:t>
+                      </a:r>
+                    </a:p>
+                  </a:txBody>
+                  <a:tcPr marL="7620" marR="7620" marT="7620" marB="0" anchor="b"/>
+                </a:tc>
+                <a:tc>
+                  <a:txBody>
+                    <a:bodyPr/>
+                    <a:lstStyle/>
+                    <a:p>
+                      <a:pPr marL="0" algn="ctr" defTabSz="914400" rtl="0" eaLnBrk="1" fontAlgn="b" latinLnBrk="0" hangingPunct="1"/>
+                      <a:r>
+                        <a:rPr lang="en-US" sz="1400" u="none" strike="noStrike" kern="1200" dirty="0">
+                          <a:solidFill>
+                            <a:schemeClr val="dk1"/>
+                          </a:solidFill>
+                          <a:effectLst/>
+                          <a:latin typeface="+mn-lt"/>
+                          <a:ea typeface="+mn-ea"/>
+                          <a:cs typeface="+mn-cs"/>
+                        </a:rPr>
+                        <a:t>Lasso (a.05)</a:t>
+                      </a:r>
+                    </a:p>
+                  </a:txBody>
+                  <a:tcPr marL="7620" marR="7620" marT="7620" marB="0" anchor="b"/>
+                </a:tc>
+                <a:tc>
+                  <a:txBody>
+                    <a:bodyPr/>
+                    <a:lstStyle/>
+                    <a:p>
+                      <a:pPr marL="0" algn="r" defTabSz="914400" rtl="0" eaLnBrk="1" fontAlgn="b" latinLnBrk="0" hangingPunct="1"/>
+                      <a:r>
+                        <a:rPr lang="en-US" sz="1400" u="none" strike="noStrike" kern="1200" dirty="0">
+                          <a:solidFill>
+                            <a:schemeClr val="dk1"/>
+                          </a:solidFill>
+                          <a:effectLst/>
+                          <a:latin typeface="+mn-lt"/>
+                          <a:ea typeface="+mn-ea"/>
+                          <a:cs typeface="+mn-cs"/>
+                        </a:rPr>
+                        <a:t>0.616</a:t>
+                      </a:r>
+                    </a:p>
+                  </a:txBody>
+                  <a:tcPr marL="7620" marR="7620" marT="7620" marB="0" anchor="b"/>
+                </a:tc>
+                <a:tc>
+                  <a:txBody>
+                    <a:bodyPr/>
+                    <a:lstStyle/>
+                    <a:p>
+                      <a:pPr marL="0" algn="r" defTabSz="914400" rtl="0" eaLnBrk="1" fontAlgn="b" latinLnBrk="0" hangingPunct="1"/>
+                      <a:r>
+                        <a:rPr lang="en-US" sz="1400" u="none" strike="noStrike" kern="1200" dirty="0" smtClean="0">
+                          <a:solidFill>
+                            <a:schemeClr val="dk1"/>
+                          </a:solidFill>
+                          <a:effectLst/>
+                          <a:latin typeface="+mn-lt"/>
+                          <a:ea typeface="+mn-ea"/>
+                          <a:cs typeface="+mn-cs"/>
+                        </a:rPr>
+                        <a:t>49.65 </a:t>
+                      </a:r>
+                      <a:endParaRPr lang="en-US" sz="1400" u="none" strike="noStrike" kern="1200" dirty="0">
+                        <a:solidFill>
+                          <a:schemeClr val="dk1"/>
+                        </a:solidFill>
+                        <a:effectLst/>
+                        <a:latin typeface="+mn-lt"/>
+                        <a:ea typeface="+mn-ea"/>
+                        <a:cs typeface="+mn-cs"/>
+                      </a:endParaRPr>
+                    </a:p>
+                  </a:txBody>
+                  <a:tcPr marL="7620" marR="7620" marT="7620" marB="0" anchor="b"/>
+                </a:tc>
+              </a:tr>
+              <a:tr h="319088">
+                <a:tc>
+                  <a:txBody>
+                    <a:bodyPr/>
+                    <a:lstStyle/>
+                    <a:p>
+                      <a:pPr marL="0" algn="r" defTabSz="914400" rtl="0" eaLnBrk="1" fontAlgn="b" latinLnBrk="0" hangingPunct="1"/>
+                      <a:r>
+                        <a:rPr lang="en-US" sz="1400" u="none" strike="noStrike" kern="1200">
+                          <a:solidFill>
+                            <a:schemeClr val="dk1"/>
+                          </a:solidFill>
+                          <a:effectLst/>
+                          <a:latin typeface="+mn-lt"/>
+                          <a:ea typeface="+mn-ea"/>
+                          <a:cs typeface="+mn-cs"/>
+                        </a:rPr>
+                        <a:t>49</a:t>
+                      </a:r>
+                    </a:p>
+                  </a:txBody>
+                  <a:tcPr marL="7620" marR="7620" marT="7620" marB="0" anchor="b"/>
+                </a:tc>
+                <a:tc>
+                  <a:txBody>
+                    <a:bodyPr/>
+                    <a:lstStyle/>
+                    <a:p>
+                      <a:pPr marL="0" algn="ctr" defTabSz="914400" rtl="0" eaLnBrk="1" fontAlgn="b" latinLnBrk="0" hangingPunct="1"/>
+                      <a:r>
+                        <a:rPr lang="en-US" sz="1400" u="none" strike="noStrike" kern="1200" dirty="0" err="1">
+                          <a:solidFill>
+                            <a:schemeClr val="dk1"/>
+                          </a:solidFill>
+                          <a:effectLst/>
+                          <a:latin typeface="+mn-lt"/>
+                          <a:ea typeface="+mn-ea"/>
+                          <a:cs typeface="+mn-cs"/>
+                        </a:rPr>
+                        <a:t>ElasticNet</a:t>
+                      </a:r>
+                      <a:r>
+                        <a:rPr lang="en-US" sz="1400" u="none" strike="noStrike" kern="1200" dirty="0">
+                          <a:solidFill>
+                            <a:schemeClr val="dk1"/>
+                          </a:solidFill>
+                          <a:effectLst/>
+                          <a:latin typeface="+mn-lt"/>
+                          <a:ea typeface="+mn-ea"/>
+                          <a:cs typeface="+mn-cs"/>
+                        </a:rPr>
+                        <a:t> (a.01)</a:t>
+                      </a:r>
+                    </a:p>
+                  </a:txBody>
+                  <a:tcPr marL="7620" marR="7620" marT="7620" marB="0" anchor="b"/>
+                </a:tc>
+                <a:tc>
+                  <a:txBody>
+                    <a:bodyPr/>
+                    <a:lstStyle/>
+                    <a:p>
+                      <a:pPr marL="0" algn="r" defTabSz="914400" rtl="0" eaLnBrk="1" fontAlgn="b" latinLnBrk="0" hangingPunct="1"/>
+                      <a:r>
+                        <a:rPr lang="en-US" sz="1400" u="none" strike="noStrike" kern="1200" dirty="0">
+                          <a:solidFill>
+                            <a:schemeClr val="dk1"/>
+                          </a:solidFill>
+                          <a:effectLst/>
+                          <a:latin typeface="+mn-lt"/>
+                          <a:ea typeface="+mn-ea"/>
+                          <a:cs typeface="+mn-cs"/>
+                        </a:rPr>
+                        <a:t>0.582</a:t>
+                      </a:r>
+                    </a:p>
+                  </a:txBody>
+                  <a:tcPr marL="7620" marR="7620" marT="7620" marB="0" anchor="b"/>
+                </a:tc>
+                <a:tc>
+                  <a:txBody>
+                    <a:bodyPr/>
+                    <a:lstStyle/>
+                    <a:p>
+                      <a:pPr marL="0" algn="r" defTabSz="914400" rtl="0" eaLnBrk="1" fontAlgn="b" latinLnBrk="0" hangingPunct="1"/>
+                      <a:r>
+                        <a:rPr lang="en-US" sz="1400" u="none" strike="noStrike" kern="1200" dirty="0" smtClean="0">
+                          <a:solidFill>
+                            <a:schemeClr val="dk1"/>
+                          </a:solidFill>
+                          <a:effectLst/>
+                          <a:latin typeface="+mn-lt"/>
+                          <a:ea typeface="+mn-ea"/>
+                          <a:cs typeface="+mn-cs"/>
+                        </a:rPr>
+                        <a:t>51.78 </a:t>
+                      </a:r>
+                      <a:endParaRPr lang="en-US" sz="1400" u="none" strike="noStrike" kern="1200" dirty="0">
+                        <a:solidFill>
+                          <a:schemeClr val="dk1"/>
+                        </a:solidFill>
+                        <a:effectLst/>
+                        <a:latin typeface="+mn-lt"/>
+                        <a:ea typeface="+mn-ea"/>
+                        <a:cs typeface="+mn-cs"/>
+                      </a:endParaRPr>
+                    </a:p>
+                  </a:txBody>
+                  <a:tcPr marL="7620" marR="7620" marT="7620" marB="0" anchor="b"/>
+                </a:tc>
+              </a:tr>
+              <a:tr h="319088">
+                <a:tc>
+                  <a:txBody>
+                    <a:bodyPr/>
+                    <a:lstStyle/>
+                    <a:p>
+                      <a:pPr marL="0" algn="r" defTabSz="914400" rtl="0" eaLnBrk="1" fontAlgn="b" latinLnBrk="0" hangingPunct="1"/>
+                      <a:r>
+                        <a:rPr lang="en-US" sz="1400" u="none" strike="noStrike" kern="1200">
+                          <a:solidFill>
+                            <a:schemeClr val="dk1"/>
+                          </a:solidFill>
+                          <a:effectLst/>
+                          <a:latin typeface="+mn-lt"/>
+                          <a:ea typeface="+mn-ea"/>
+                          <a:cs typeface="+mn-cs"/>
+                        </a:rPr>
+                        <a:t>50</a:t>
+                      </a:r>
+                    </a:p>
+                  </a:txBody>
+                  <a:tcPr marL="7620" marR="7620" marT="7620" marB="0" anchor="b"/>
+                </a:tc>
+                <a:tc>
+                  <a:txBody>
+                    <a:bodyPr/>
+                    <a:lstStyle/>
+                    <a:p>
+                      <a:pPr marL="0" algn="ctr" defTabSz="914400" rtl="0" eaLnBrk="1" fontAlgn="b" latinLnBrk="0" hangingPunct="1"/>
+                      <a:r>
+                        <a:rPr lang="en-US" sz="1400" u="none" strike="noStrike" kern="1200" dirty="0" err="1">
+                          <a:solidFill>
+                            <a:schemeClr val="dk1"/>
+                          </a:solidFill>
+                          <a:effectLst/>
+                          <a:latin typeface="+mn-lt"/>
+                          <a:ea typeface="+mn-ea"/>
+                          <a:cs typeface="+mn-cs"/>
+                        </a:rPr>
+                        <a:t>ElasticNet</a:t>
+                      </a:r>
+                      <a:r>
+                        <a:rPr lang="en-US" sz="1400" u="none" strike="noStrike" kern="1200" dirty="0">
+                          <a:solidFill>
+                            <a:schemeClr val="dk1"/>
+                          </a:solidFill>
+                          <a:effectLst/>
+                          <a:latin typeface="+mn-lt"/>
+                          <a:ea typeface="+mn-ea"/>
+                          <a:cs typeface="+mn-cs"/>
+                        </a:rPr>
+                        <a:t> (a.05)</a:t>
+                      </a:r>
+                    </a:p>
+                  </a:txBody>
+                  <a:tcPr marL="7620" marR="7620" marT="7620" marB="0" anchor="b"/>
+                </a:tc>
+                <a:tc>
+                  <a:txBody>
+                    <a:bodyPr/>
+                    <a:lstStyle/>
+                    <a:p>
+                      <a:pPr marL="0" algn="r" defTabSz="914400" rtl="0" eaLnBrk="1" fontAlgn="b" latinLnBrk="0" hangingPunct="1"/>
+                      <a:r>
+                        <a:rPr lang="en-US" sz="1400" u="none" strike="noStrike" kern="1200" dirty="0">
+                          <a:solidFill>
+                            <a:schemeClr val="dk1"/>
+                          </a:solidFill>
+                          <a:effectLst/>
+                          <a:latin typeface="+mn-lt"/>
+                          <a:ea typeface="+mn-ea"/>
+                          <a:cs typeface="+mn-cs"/>
+                        </a:rPr>
+                        <a:t>0.568</a:t>
+                      </a:r>
+                    </a:p>
+                  </a:txBody>
+                  <a:tcPr marL="7620" marR="7620" marT="7620" marB="0" anchor="b"/>
+                </a:tc>
+                <a:tc>
+                  <a:txBody>
+                    <a:bodyPr/>
+                    <a:lstStyle/>
+                    <a:p>
+                      <a:pPr marL="0" algn="r" defTabSz="914400" rtl="0" eaLnBrk="1" fontAlgn="b" latinLnBrk="0" hangingPunct="1"/>
+                      <a:r>
+                        <a:rPr lang="en-US" sz="1400" u="none" strike="noStrike" kern="1200" dirty="0" smtClean="0">
+                          <a:solidFill>
+                            <a:schemeClr val="dk1"/>
+                          </a:solidFill>
+                          <a:effectLst/>
+                          <a:latin typeface="+mn-lt"/>
+                          <a:ea typeface="+mn-ea"/>
+                          <a:cs typeface="+mn-cs"/>
+                        </a:rPr>
+                        <a:t>52.61 </a:t>
                       </a:r>
                       <a:endParaRPr lang="en-US" sz="1400" u="none" strike="noStrike" kern="1200" dirty="0">
                         <a:solidFill>
@@ -6342,20 +6960,19 @@
                     <a:bodyPr/>
                     <a:lstStyle/>
                     <a:p>
-                      <a:pPr algn="r" fontAlgn="b"/>
+                      <a:pPr marL="0" algn="r" defTabSz="914400" rtl="0" eaLnBrk="1" fontAlgn="b" latinLnBrk="0" hangingPunct="1"/>
                       <a:r>
-                        <a:rPr lang="en-US" sz="1400" u="none" strike="noStrike" dirty="0">
+                        <a:rPr lang="en-US" sz="1400" u="none" strike="noStrike" kern="1200" dirty="0">
+                          <a:solidFill>
+                            <a:schemeClr val="dk1"/>
+                          </a:solidFill>
                           <a:effectLst/>
+                          <a:latin typeface="+mn-lt"/>
+                          <a:ea typeface="+mn-ea"/>
+                          <a:cs typeface="+mn-cs"/>
                         </a:rPr>
                         <a:t>33</a:t>
                       </a:r>
-                      <a:endParaRPr lang="en-US" sz="1400" b="0" i="0" u="none" strike="noStrike" dirty="0">
-                        <a:solidFill>
-                          <a:srgbClr val="000000"/>
-                        </a:solidFill>
-                        <a:effectLst/>
-                        <a:latin typeface="Calibri"/>
-                      </a:endParaRPr>
                     </a:p>
                   </a:txBody>
                   <a:tcPr marL="7620" marR="7620" marT="7620" marB="0" anchor="b"/>
@@ -6365,20 +6982,19 @@
                     <a:bodyPr/>
                     <a:lstStyle/>
                     <a:p>
-                      <a:pPr algn="ctr" fontAlgn="b"/>
+                      <a:pPr marL="0" algn="ctr" defTabSz="914400" rtl="0" eaLnBrk="1" fontAlgn="b" latinLnBrk="0" hangingPunct="1"/>
                       <a:r>
-                        <a:rPr lang="en-US" sz="1400" u="none" strike="noStrike" dirty="0">
+                        <a:rPr lang="en-US" sz="1400" u="none" strike="noStrike" kern="1200" dirty="0">
+                          <a:solidFill>
+                            <a:schemeClr val="dk1"/>
+                          </a:solidFill>
                           <a:effectLst/>
+                          <a:latin typeface="+mn-lt"/>
+                          <a:ea typeface="+mn-ea"/>
+                          <a:cs typeface="+mn-cs"/>
                         </a:rPr>
                         <a:t>Random Forest (2000)</a:t>
                       </a:r>
-                      <a:endParaRPr lang="en-US" sz="1400" b="0" i="0" u="none" strike="noStrike" dirty="0">
-                        <a:solidFill>
-                          <a:srgbClr val="000000"/>
-                        </a:solidFill>
-                        <a:effectLst/>
-                        <a:latin typeface="Calibri"/>
-                      </a:endParaRPr>
                     </a:p>
                   </a:txBody>
                   <a:tcPr marL="7620" marR="7620" marT="7620" marB="0" anchor="b"/>
@@ -6388,20 +7004,19 @@
                     <a:bodyPr/>
                     <a:lstStyle/>
                     <a:p>
-                      <a:pPr algn="r" fontAlgn="b"/>
+                      <a:pPr marL="0" algn="r" defTabSz="914400" rtl="0" eaLnBrk="1" fontAlgn="b" latinLnBrk="0" hangingPunct="1"/>
                       <a:r>
-                        <a:rPr lang="en-US" sz="1400" u="none" strike="noStrike" dirty="0">
+                        <a:rPr lang="en-US" sz="1400" u="none" strike="noStrike" kern="1200" dirty="0">
+                          <a:solidFill>
+                            <a:schemeClr val="dk1"/>
+                          </a:solidFill>
                           <a:effectLst/>
+                          <a:latin typeface="+mn-lt"/>
+                          <a:ea typeface="+mn-ea"/>
+                          <a:cs typeface="+mn-cs"/>
                         </a:rPr>
                         <a:t>0.553</a:t>
                       </a:r>
-                      <a:endParaRPr lang="en-US" sz="1400" b="0" i="0" u="none" strike="noStrike" dirty="0">
-                        <a:solidFill>
-                          <a:srgbClr val="000000"/>
-                        </a:solidFill>
-                        <a:effectLst/>
-                        <a:latin typeface="Calibri"/>
-                      </a:endParaRPr>
                     </a:p>
                   </a:txBody>
                   <a:tcPr marL="7620" marR="7620" marT="7620" marB="0" anchor="b"/>
@@ -6411,19 +7026,27 @@
                     <a:bodyPr/>
                     <a:lstStyle/>
                     <a:p>
-                      <a:pPr algn="r" fontAlgn="b"/>
+                      <a:pPr marL="0" algn="r" defTabSz="914400" rtl="0" eaLnBrk="1" fontAlgn="b" latinLnBrk="0" hangingPunct="1"/>
                       <a:r>
-                        <a:rPr lang="en-US" sz="1400" u="none" strike="noStrike" dirty="0" smtClean="0">
+                        <a:rPr lang="en-US" sz="1400" u="none" strike="noStrike" kern="1200" dirty="0" smtClean="0">
+                          <a:solidFill>
+                            <a:schemeClr val="dk1"/>
+                          </a:solidFill>
                           <a:effectLst/>
+                          <a:latin typeface="+mn-lt"/>
+                          <a:ea typeface="+mn-ea"/>
+                          <a:cs typeface="+mn-cs"/>
                         </a:rPr>
                         <a:t>39.33 </a:t>
                       </a:r>
-                      <a:endParaRPr lang="en-US" sz="1400" b="0" i="0" u="none" strike="noStrike" dirty="0">
+                      <a:endParaRPr lang="en-US" sz="1400" u="none" strike="noStrike" kern="1200" dirty="0">
                         <a:solidFill>
-                          <a:srgbClr val="000000"/>
+                          <a:schemeClr val="dk1"/>
                         </a:solidFill>
                         <a:effectLst/>
-                        <a:latin typeface="Calibri"/>
+                        <a:latin typeface="+mn-lt"/>
+                        <a:ea typeface="+mn-ea"/>
+                        <a:cs typeface="+mn-cs"/>
                       </a:endParaRPr>
                     </a:p>
                   </a:txBody>
@@ -6436,20 +7059,19 @@
                     <a:bodyPr/>
                     <a:lstStyle/>
                     <a:p>
-                      <a:pPr algn="r" fontAlgn="b"/>
+                      <a:pPr marL="0" algn="r" defTabSz="914400" rtl="0" eaLnBrk="1" fontAlgn="b" latinLnBrk="0" hangingPunct="1"/>
                       <a:r>
-                        <a:rPr lang="en-US" sz="1400" u="none" strike="noStrike" dirty="0">
+                        <a:rPr lang="en-US" sz="1400" u="none" strike="noStrike" kern="1200" dirty="0">
+                          <a:solidFill>
+                            <a:schemeClr val="dk1"/>
+                          </a:solidFill>
                           <a:effectLst/>
+                          <a:latin typeface="+mn-lt"/>
+                          <a:ea typeface="+mn-ea"/>
+                          <a:cs typeface="+mn-cs"/>
                         </a:rPr>
                         <a:t>25</a:t>
                       </a:r>
-                      <a:endParaRPr lang="en-US" sz="1400" b="0" i="0" u="none" strike="noStrike" dirty="0">
-                        <a:solidFill>
-                          <a:srgbClr val="000000"/>
-                        </a:solidFill>
-                        <a:effectLst/>
-                        <a:latin typeface="Calibri"/>
-                      </a:endParaRPr>
                     </a:p>
                   </a:txBody>
                   <a:tcPr marL="7620" marR="7620" marT="7620" marB="0" anchor="b"/>
@@ -6459,20 +7081,19 @@
                     <a:bodyPr/>
                     <a:lstStyle/>
                     <a:p>
-                      <a:pPr algn="ctr" fontAlgn="b"/>
+                      <a:pPr marL="0" algn="ctr" defTabSz="914400" rtl="0" eaLnBrk="1" fontAlgn="b" latinLnBrk="0" hangingPunct="1"/>
                       <a:r>
-                        <a:rPr lang="en-US" sz="1400" u="none" strike="noStrike" dirty="0">
+                        <a:rPr lang="en-US" sz="1400" u="none" strike="noStrike" kern="1200" dirty="0">
+                          <a:solidFill>
+                            <a:schemeClr val="dk1"/>
+                          </a:solidFill>
                           <a:effectLst/>
+                          <a:latin typeface="+mn-lt"/>
+                          <a:ea typeface="+mn-ea"/>
+                          <a:cs typeface="+mn-cs"/>
                         </a:rPr>
                         <a:t>Random Forest (2000)</a:t>
                       </a:r>
-                      <a:endParaRPr lang="en-US" sz="1400" b="0" i="0" u="none" strike="noStrike" dirty="0">
-                        <a:solidFill>
-                          <a:srgbClr val="000000"/>
-                        </a:solidFill>
-                        <a:effectLst/>
-                        <a:latin typeface="Calibri"/>
-                      </a:endParaRPr>
                     </a:p>
                   </a:txBody>
                   <a:tcPr marL="7620" marR="7620" marT="7620" marB="0" anchor="b"/>
@@ -6482,20 +7103,19 @@
                     <a:bodyPr/>
                     <a:lstStyle/>
                     <a:p>
-                      <a:pPr algn="r" fontAlgn="b"/>
+                      <a:pPr marL="0" algn="r" defTabSz="914400" rtl="0" eaLnBrk="1" fontAlgn="b" latinLnBrk="0" hangingPunct="1"/>
                       <a:r>
-                        <a:rPr lang="en-US" sz="1400" u="none" strike="noStrike" dirty="0">
+                        <a:rPr lang="en-US" sz="1400" u="none" strike="noStrike" kern="1200" dirty="0">
+                          <a:solidFill>
+                            <a:schemeClr val="dk1"/>
+                          </a:solidFill>
                           <a:effectLst/>
+                          <a:latin typeface="+mn-lt"/>
+                          <a:ea typeface="+mn-ea"/>
+                          <a:cs typeface="+mn-cs"/>
                         </a:rPr>
                         <a:t>0.552</a:t>
                       </a:r>
-                      <a:endParaRPr lang="en-US" sz="1400" b="0" i="0" u="none" strike="noStrike" dirty="0">
-                        <a:solidFill>
-                          <a:srgbClr val="000000"/>
-                        </a:solidFill>
-                        <a:effectLst/>
-                        <a:latin typeface="Calibri"/>
-                      </a:endParaRPr>
                     </a:p>
                   </a:txBody>
                   <a:tcPr marL="7620" marR="7620" marT="7620" marB="0" anchor="b"/>
@@ -6505,19 +7125,27 @@
                     <a:bodyPr/>
                     <a:lstStyle/>
                     <a:p>
-                      <a:pPr algn="r" fontAlgn="b"/>
+                      <a:pPr marL="0" algn="r" defTabSz="914400" rtl="0" eaLnBrk="1" fontAlgn="b" latinLnBrk="0" hangingPunct="1"/>
                       <a:r>
-                        <a:rPr lang="en-US" sz="1400" u="none" strike="noStrike" dirty="0" smtClean="0">
+                        <a:rPr lang="en-US" sz="1400" u="none" strike="noStrike" kern="1200" dirty="0" smtClean="0">
+                          <a:solidFill>
+                            <a:schemeClr val="dk1"/>
+                          </a:solidFill>
                           <a:effectLst/>
+                          <a:latin typeface="+mn-lt"/>
+                          <a:ea typeface="+mn-ea"/>
+                          <a:cs typeface="+mn-cs"/>
                         </a:rPr>
                         <a:t>39.35 </a:t>
                       </a:r>
-                      <a:endParaRPr lang="en-US" sz="1400" b="0" i="0" u="none" strike="noStrike" dirty="0">
+                      <a:endParaRPr lang="en-US" sz="1400" u="none" strike="noStrike" kern="1200" dirty="0">
                         <a:solidFill>
-                          <a:srgbClr val="000000"/>
+                          <a:schemeClr val="dk1"/>
                         </a:solidFill>
                         <a:effectLst/>
-                        <a:latin typeface="Calibri"/>
+                        <a:latin typeface="+mn-lt"/>
+                        <a:ea typeface="+mn-ea"/>
+                        <a:cs typeface="+mn-cs"/>
                       </a:endParaRPr>
                     </a:p>
                   </a:txBody>
@@ -6530,20 +7158,19 @@
                     <a:bodyPr/>
                     <a:lstStyle/>
                     <a:p>
-                      <a:pPr algn="r" fontAlgn="b"/>
+                      <a:pPr marL="0" algn="r" defTabSz="914400" rtl="0" eaLnBrk="1" fontAlgn="b" latinLnBrk="0" hangingPunct="1"/>
                       <a:r>
-                        <a:rPr lang="en-US" sz="1400" u="none" strike="noStrike">
+                        <a:rPr lang="en-US" sz="1400" u="none" strike="noStrike" kern="1200" dirty="0">
+                          <a:solidFill>
+                            <a:schemeClr val="dk1"/>
+                          </a:solidFill>
                           <a:effectLst/>
+                          <a:latin typeface="+mn-lt"/>
+                          <a:ea typeface="+mn-ea"/>
+                          <a:cs typeface="+mn-cs"/>
                         </a:rPr>
                         <a:t>21</a:t>
                       </a:r>
-                      <a:endParaRPr lang="en-US" sz="1400" b="0" i="0" u="none" strike="noStrike">
-                        <a:solidFill>
-                          <a:srgbClr val="000000"/>
-                        </a:solidFill>
-                        <a:effectLst/>
-                        <a:latin typeface="Calibri"/>
-                      </a:endParaRPr>
                     </a:p>
                   </a:txBody>
                   <a:tcPr marL="7620" marR="7620" marT="7620" marB="0" anchor="b"/>
@@ -6553,20 +7180,19 @@
                     <a:bodyPr/>
                     <a:lstStyle/>
                     <a:p>
-                      <a:pPr algn="ctr" fontAlgn="b"/>
+                      <a:pPr marL="0" algn="ctr" defTabSz="914400" rtl="0" eaLnBrk="1" fontAlgn="b" latinLnBrk="0" hangingPunct="1"/>
                       <a:r>
-                        <a:rPr lang="en-US" sz="1400" u="none" strike="noStrike" dirty="0">
+                        <a:rPr lang="en-US" sz="1400" u="none" strike="noStrike" kern="1200" dirty="0">
+                          <a:solidFill>
+                            <a:schemeClr val="dk1"/>
+                          </a:solidFill>
                           <a:effectLst/>
+                          <a:latin typeface="+mn-lt"/>
+                          <a:ea typeface="+mn-ea"/>
+                          <a:cs typeface="+mn-cs"/>
                         </a:rPr>
                         <a:t>Random Forest (2000)</a:t>
                       </a:r>
-                      <a:endParaRPr lang="en-US" sz="1400" b="0" i="0" u="none" strike="noStrike" dirty="0">
-                        <a:solidFill>
-                          <a:srgbClr val="000000"/>
-                        </a:solidFill>
-                        <a:effectLst/>
-                        <a:latin typeface="Calibri"/>
-                      </a:endParaRPr>
                     </a:p>
                   </a:txBody>
                   <a:tcPr marL="7620" marR="7620" marT="7620" marB="0" anchor="b"/>
@@ -6576,20 +7202,19 @@
                     <a:bodyPr/>
                     <a:lstStyle/>
                     <a:p>
-                      <a:pPr algn="r" fontAlgn="b"/>
+                      <a:pPr marL="0" algn="r" defTabSz="914400" rtl="0" eaLnBrk="1" fontAlgn="b" latinLnBrk="0" hangingPunct="1"/>
                       <a:r>
-                        <a:rPr lang="en-US" sz="1400" u="none" strike="noStrike">
+                        <a:rPr lang="en-US" sz="1400" u="none" strike="noStrike" kern="1200" dirty="0">
+                          <a:solidFill>
+                            <a:schemeClr val="dk1"/>
+                          </a:solidFill>
                           <a:effectLst/>
+                          <a:latin typeface="+mn-lt"/>
+                          <a:ea typeface="+mn-ea"/>
+                          <a:cs typeface="+mn-cs"/>
                         </a:rPr>
                         <a:t>0.514</a:t>
                       </a:r>
-                      <a:endParaRPr lang="en-US" sz="1400" b="0" i="0" u="none" strike="noStrike">
-                        <a:solidFill>
-                          <a:srgbClr val="000000"/>
-                        </a:solidFill>
-                        <a:effectLst/>
-                        <a:latin typeface="Calibri"/>
-                      </a:endParaRPr>
                     </a:p>
                   </a:txBody>
                   <a:tcPr marL="7620" marR="7620" marT="7620" marB="0" anchor="b"/>
@@ -6599,19 +7224,27 @@
                     <a:bodyPr/>
                     <a:lstStyle/>
                     <a:p>
-                      <a:pPr algn="r" fontAlgn="b"/>
+                      <a:pPr marL="0" algn="r" defTabSz="914400" rtl="0" eaLnBrk="1" fontAlgn="b" latinLnBrk="0" hangingPunct="1"/>
                       <a:r>
-                        <a:rPr lang="en-US" sz="1400" u="none" strike="noStrike" dirty="0" smtClean="0">
+                        <a:rPr lang="en-US" sz="1400" u="none" strike="noStrike" kern="1200" dirty="0" smtClean="0">
+                          <a:solidFill>
+                            <a:schemeClr val="dk1"/>
+                          </a:solidFill>
                           <a:effectLst/>
+                          <a:latin typeface="+mn-lt"/>
+                          <a:ea typeface="+mn-ea"/>
+                          <a:cs typeface="+mn-cs"/>
                         </a:rPr>
                         <a:t>64.72 </a:t>
                       </a:r>
-                      <a:endParaRPr lang="en-US" sz="1400" b="0" i="0" u="none" strike="noStrike" dirty="0">
+                      <a:endParaRPr lang="en-US" sz="1400" u="none" strike="noStrike" kern="1200" dirty="0">
                         <a:solidFill>
-                          <a:srgbClr val="000000"/>
+                          <a:schemeClr val="dk1"/>
                         </a:solidFill>
                         <a:effectLst/>
-                        <a:latin typeface="Calibri"/>
+                        <a:latin typeface="+mn-lt"/>
+                        <a:ea typeface="+mn-ea"/>
+                        <a:cs typeface="+mn-cs"/>
                       </a:endParaRPr>
                     </a:p>
                   </a:txBody>
@@ -6624,20 +7257,19 @@
                     <a:bodyPr/>
                     <a:lstStyle/>
                     <a:p>
-                      <a:pPr algn="r" fontAlgn="b"/>
+                      <a:pPr marL="0" algn="r" defTabSz="914400" rtl="0" eaLnBrk="1" fontAlgn="b" latinLnBrk="0" hangingPunct="1"/>
                       <a:r>
-                        <a:rPr lang="en-US" sz="1400" u="none" strike="noStrike" dirty="0">
+                        <a:rPr lang="en-US" sz="1400" u="none" strike="noStrike" kern="1200" dirty="0">
+                          <a:solidFill>
+                            <a:schemeClr val="dk1"/>
+                          </a:solidFill>
                           <a:effectLst/>
+                          <a:latin typeface="+mn-lt"/>
+                          <a:ea typeface="+mn-ea"/>
+                          <a:cs typeface="+mn-cs"/>
                         </a:rPr>
                         <a:t>27</a:t>
                       </a:r>
-                      <a:endParaRPr lang="en-US" sz="1400" b="0" i="0" u="none" strike="noStrike" dirty="0">
-                        <a:solidFill>
-                          <a:srgbClr val="000000"/>
-                        </a:solidFill>
-                        <a:effectLst/>
-                        <a:latin typeface="Calibri"/>
-                      </a:endParaRPr>
                     </a:p>
                   </a:txBody>
                   <a:tcPr marL="7620" marR="7620" marT="7620" marB="0" anchor="b"/>
@@ -6647,20 +7279,19 @@
                     <a:bodyPr/>
                     <a:lstStyle/>
                     <a:p>
-                      <a:pPr algn="ctr" fontAlgn="b"/>
+                      <a:pPr marL="0" algn="ctr" defTabSz="914400" rtl="0" eaLnBrk="1" fontAlgn="b" latinLnBrk="0" hangingPunct="1"/>
                       <a:r>
-                        <a:rPr lang="en-US" sz="1400" u="none" strike="noStrike" dirty="0">
+                        <a:rPr lang="en-US" sz="1400" u="none" strike="noStrike" kern="1200" dirty="0">
+                          <a:solidFill>
+                            <a:schemeClr val="dk1"/>
+                          </a:solidFill>
                           <a:effectLst/>
+                          <a:latin typeface="+mn-lt"/>
+                          <a:ea typeface="+mn-ea"/>
+                          <a:cs typeface="+mn-cs"/>
                         </a:rPr>
                         <a:t>Random Forest (2000)</a:t>
                       </a:r>
-                      <a:endParaRPr lang="en-US" sz="1400" b="0" i="0" u="none" strike="noStrike" dirty="0">
-                        <a:solidFill>
-                          <a:srgbClr val="000000"/>
-                        </a:solidFill>
-                        <a:effectLst/>
-                        <a:latin typeface="Calibri"/>
-                      </a:endParaRPr>
                     </a:p>
                   </a:txBody>
                   <a:tcPr marL="7620" marR="7620" marT="7620" marB="0" anchor="b"/>
@@ -6670,20 +7301,19 @@
                     <a:bodyPr/>
                     <a:lstStyle/>
                     <a:p>
-                      <a:pPr algn="r" fontAlgn="b"/>
+                      <a:pPr marL="0" algn="r" defTabSz="914400" rtl="0" eaLnBrk="1" fontAlgn="b" latinLnBrk="0" hangingPunct="1"/>
                       <a:r>
-                        <a:rPr lang="en-US" sz="1400" u="none" strike="noStrike" dirty="0">
+                        <a:rPr lang="en-US" sz="1400" u="none" strike="noStrike" kern="1200" dirty="0">
+                          <a:solidFill>
+                            <a:schemeClr val="dk1"/>
+                          </a:solidFill>
                           <a:effectLst/>
+                          <a:latin typeface="+mn-lt"/>
+                          <a:ea typeface="+mn-ea"/>
+                          <a:cs typeface="+mn-cs"/>
                         </a:rPr>
                         <a:t>0.514</a:t>
                       </a:r>
-                      <a:endParaRPr lang="en-US" sz="1400" b="0" i="0" u="none" strike="noStrike" dirty="0">
-                        <a:solidFill>
-                          <a:srgbClr val="000000"/>
-                        </a:solidFill>
-                        <a:effectLst/>
-                        <a:latin typeface="Calibri"/>
-                      </a:endParaRPr>
                     </a:p>
                   </a:txBody>
                   <a:tcPr marL="7620" marR="7620" marT="7620" marB="0" anchor="b"/>
@@ -6693,19 +7323,27 @@
                     <a:bodyPr/>
                     <a:lstStyle/>
                     <a:p>
-                      <a:pPr algn="r" fontAlgn="b"/>
+                      <a:pPr marL="0" algn="r" defTabSz="914400" rtl="0" eaLnBrk="1" fontAlgn="b" latinLnBrk="0" hangingPunct="1"/>
                       <a:r>
-                        <a:rPr lang="en-US" sz="1400" u="none" strike="noStrike" dirty="0" smtClean="0">
+                        <a:rPr lang="en-US" sz="1400" u="none" strike="noStrike" kern="1200" dirty="0" smtClean="0">
+                          <a:solidFill>
+                            <a:schemeClr val="dk1"/>
+                          </a:solidFill>
                           <a:effectLst/>
+                          <a:latin typeface="+mn-lt"/>
+                          <a:ea typeface="+mn-ea"/>
+                          <a:cs typeface="+mn-cs"/>
                         </a:rPr>
                         <a:t>64.72 </a:t>
                       </a:r>
-                      <a:endParaRPr lang="en-US" sz="1400" b="0" i="0" u="none" strike="noStrike" dirty="0">
+                      <a:endParaRPr lang="en-US" sz="1400" u="none" strike="noStrike" kern="1200" dirty="0">
                         <a:solidFill>
-                          <a:srgbClr val="000000"/>
+                          <a:schemeClr val="dk1"/>
                         </a:solidFill>
                         <a:effectLst/>
-                        <a:latin typeface="Calibri"/>
+                        <a:latin typeface="+mn-lt"/>
+                        <a:ea typeface="+mn-ea"/>
+                        <a:cs typeface="+mn-cs"/>
                       </a:endParaRPr>
                     </a:p>
                   </a:txBody>
@@ -6718,19 +7356,27 @@
                     <a:bodyPr/>
                     <a:lstStyle/>
                     <a:p>
-                      <a:pPr algn="r" fontAlgn="b"/>
+                      <a:pPr marL="0" algn="r" defTabSz="914400" rtl="0" eaLnBrk="1" fontAlgn="b" latinLnBrk="0" hangingPunct="1"/>
                       <a:r>
-                        <a:rPr lang="en-US" sz="1400" u="none" strike="noStrike">
+                        <a:rPr lang="en-US" sz="1400" u="none" strike="noStrike" kern="1200" dirty="0" smtClean="0">
+                          <a:solidFill>
+                            <a:schemeClr val="dk1"/>
+                          </a:solidFill>
                           <a:effectLst/>
+                          <a:latin typeface="+mn-lt"/>
+                          <a:ea typeface="+mn-ea"/>
+                          <a:cs typeface="+mn-cs"/>
                         </a:rPr>
-                        <a:t>28</a:t>
+                        <a:t>1</a:t>
                       </a:r>
-                      <a:endParaRPr lang="en-US" sz="1400" b="0" i="0" u="none" strike="noStrike">
+                      <a:endParaRPr lang="en-US" sz="1400" u="none" strike="noStrike" kern="1200" dirty="0">
                         <a:solidFill>
-                          <a:srgbClr val="000000"/>
+                          <a:schemeClr val="dk1"/>
                         </a:solidFill>
                         <a:effectLst/>
-                        <a:latin typeface="Calibri"/>
+                        <a:latin typeface="+mn-lt"/>
+                        <a:ea typeface="+mn-ea"/>
+                        <a:cs typeface="+mn-cs"/>
                       </a:endParaRPr>
                     </a:p>
                   </a:txBody>
@@ -6741,20 +7387,19 @@
                     <a:bodyPr/>
                     <a:lstStyle/>
                     <a:p>
-                      <a:pPr algn="ctr" fontAlgn="b"/>
+                      <a:pPr marL="0" algn="ctr" defTabSz="914400" rtl="0" eaLnBrk="1" fontAlgn="b" latinLnBrk="0" hangingPunct="1"/>
                       <a:r>
-                        <a:rPr lang="en-US" sz="1400" u="none" strike="noStrike" dirty="0">
+                        <a:rPr lang="en-US" sz="1400" u="none" strike="noStrike" kern="1200" dirty="0">
+                          <a:solidFill>
+                            <a:schemeClr val="dk1"/>
+                          </a:solidFill>
                           <a:effectLst/>
+                          <a:latin typeface="+mn-lt"/>
+                          <a:ea typeface="+mn-ea"/>
+                          <a:cs typeface="+mn-cs"/>
                         </a:rPr>
                         <a:t>Linear Regression</a:t>
                       </a:r>
-                      <a:endParaRPr lang="en-US" sz="1400" b="0" i="0" u="none" strike="noStrike" dirty="0">
-                        <a:solidFill>
-                          <a:srgbClr val="000000"/>
-                        </a:solidFill>
-                        <a:effectLst/>
-                        <a:latin typeface="Calibri"/>
-                      </a:endParaRPr>
                     </a:p>
                   </a:txBody>
                   <a:tcPr marL="7620" marR="7620" marT="7620" marB="0" anchor="b"/>
@@ -6764,20 +7409,19 @@
                     <a:bodyPr/>
                     <a:lstStyle/>
                     <a:p>
-                      <a:pPr algn="r" fontAlgn="b"/>
+                      <a:pPr marL="0" algn="r" defTabSz="914400" rtl="0" eaLnBrk="1" fontAlgn="b" latinLnBrk="0" hangingPunct="1"/>
                       <a:r>
-                        <a:rPr lang="en-US" sz="1400" u="none" strike="noStrike" dirty="0">
+                        <a:rPr lang="en-US" sz="1400" u="none" strike="noStrike" kern="1200" dirty="0">
+                          <a:solidFill>
+                            <a:schemeClr val="dk1"/>
+                          </a:solidFill>
                           <a:effectLst/>
+                          <a:latin typeface="+mn-lt"/>
+                          <a:ea typeface="+mn-ea"/>
+                          <a:cs typeface="+mn-cs"/>
                         </a:rPr>
-                        <a:t>0.499</a:t>
+                        <a:t>0.326</a:t>
                       </a:r>
-                      <a:endParaRPr lang="en-US" sz="1400" b="0" i="0" u="none" strike="noStrike" dirty="0">
-                        <a:solidFill>
-                          <a:srgbClr val="000000"/>
-                        </a:solidFill>
-                        <a:effectLst/>
-                        <a:latin typeface="Calibri"/>
-                      </a:endParaRPr>
                     </a:p>
                   </a:txBody>
                   <a:tcPr marL="7620" marR="7620" marT="7620" marB="0" anchor="b"/>
@@ -6787,587 +7431,27 @@
                     <a:bodyPr/>
                     <a:lstStyle/>
                     <a:p>
-                      <a:pPr algn="r" fontAlgn="b"/>
+                      <a:pPr marL="0" algn="r" defTabSz="914400" rtl="0" eaLnBrk="1" fontAlgn="b" latinLnBrk="0" hangingPunct="1"/>
                       <a:r>
-                        <a:rPr lang="en-US" sz="1400" u="none" strike="noStrike" dirty="0" smtClean="0">
-                          <a:effectLst/>
-                        </a:rPr>
-                        <a:t>65.72 </a:t>
-                      </a:r>
-                      <a:endParaRPr lang="en-US" sz="1400" b="0" i="0" u="none" strike="noStrike" dirty="0">
-                        <a:solidFill>
-                          <a:srgbClr val="000000"/>
-                        </a:solidFill>
-                        <a:effectLst/>
-                        <a:latin typeface="Calibri"/>
-                      </a:endParaRPr>
-                    </a:p>
-                  </a:txBody>
-                  <a:tcPr marL="7620" marR="7620" marT="7620" marB="0" anchor="b"/>
-                </a:tc>
-              </a:tr>
-              <a:tr h="319088">
-                <a:tc>
-                  <a:txBody>
-                    <a:bodyPr/>
-                    <a:lstStyle/>
-                    <a:p>
-                      <a:pPr algn="r" fontAlgn="b"/>
-                      <a:r>
-                        <a:rPr lang="en-US" sz="1400" u="none" strike="noStrike">
-                          <a:effectLst/>
-                        </a:rPr>
-                        <a:t>19</a:t>
-                      </a:r>
-                      <a:endParaRPr lang="en-US" sz="1400" b="0" i="0" u="none" strike="noStrike">
-                        <a:solidFill>
-                          <a:srgbClr val="000000"/>
-                        </a:solidFill>
-                        <a:effectLst/>
-                        <a:latin typeface="Calibri"/>
-                      </a:endParaRPr>
-                    </a:p>
-                  </a:txBody>
-                  <a:tcPr marL="7620" marR="7620" marT="7620" marB="0" anchor="b"/>
-                </a:tc>
-                <a:tc>
-                  <a:txBody>
-                    <a:bodyPr/>
-                    <a:lstStyle/>
-                    <a:p>
-                      <a:pPr algn="ctr" fontAlgn="b"/>
-                      <a:r>
-                        <a:rPr lang="en-US" sz="1400" u="none" strike="noStrike" dirty="0">
-                          <a:effectLst/>
-                        </a:rPr>
-                        <a:t>Linear Regression</a:t>
-                      </a:r>
-                      <a:endParaRPr lang="en-US" sz="1400" b="0" i="0" u="none" strike="noStrike" dirty="0">
-                        <a:solidFill>
-                          <a:srgbClr val="000000"/>
-                        </a:solidFill>
-                        <a:effectLst/>
-                        <a:latin typeface="Calibri"/>
-                      </a:endParaRPr>
-                    </a:p>
-                  </a:txBody>
-                  <a:tcPr marL="7620" marR="7620" marT="7620" marB="0" anchor="b"/>
-                </a:tc>
-                <a:tc>
-                  <a:txBody>
-                    <a:bodyPr/>
-                    <a:lstStyle/>
-                    <a:p>
-                      <a:pPr algn="r" fontAlgn="b"/>
-                      <a:r>
-                        <a:rPr lang="en-US" sz="1400" u="none" strike="noStrike" dirty="0">
-                          <a:effectLst/>
-                        </a:rPr>
-                        <a:t>0.496</a:t>
-                      </a:r>
-                      <a:endParaRPr lang="en-US" sz="1400" b="0" i="0" u="none" strike="noStrike" dirty="0">
-                        <a:solidFill>
-                          <a:srgbClr val="000000"/>
-                        </a:solidFill>
-                        <a:effectLst/>
-                        <a:latin typeface="Calibri"/>
-                      </a:endParaRPr>
-                    </a:p>
-                  </a:txBody>
-                  <a:tcPr marL="7620" marR="7620" marT="7620" marB="0" anchor="b"/>
-                </a:tc>
-                <a:tc>
-                  <a:txBody>
-                    <a:bodyPr/>
-                    <a:lstStyle/>
-                    <a:p>
-                      <a:pPr algn="r" fontAlgn="b"/>
-                      <a:r>
-                        <a:rPr lang="en-US" sz="1400" u="none" strike="noStrike" dirty="0" smtClean="0">
-                          <a:effectLst/>
-                        </a:rPr>
-                        <a:t>65.91 </a:t>
-                      </a:r>
-                      <a:endParaRPr lang="en-US" sz="1400" b="0" i="0" u="none" strike="noStrike" dirty="0">
-                        <a:solidFill>
-                          <a:srgbClr val="000000"/>
-                        </a:solidFill>
-                        <a:effectLst/>
-                        <a:latin typeface="Calibri"/>
-                      </a:endParaRPr>
-                    </a:p>
-                  </a:txBody>
-                  <a:tcPr marL="7620" marR="7620" marT="7620" marB="0" anchor="b"/>
-                </a:tc>
-              </a:tr>
-              <a:tr h="357183">
-                <a:tc>
-                  <a:txBody>
-                    <a:bodyPr/>
-                    <a:lstStyle/>
-                    <a:p>
-                      <a:pPr algn="r" fontAlgn="b"/>
-                      <a:r>
-                        <a:rPr lang="en-US" sz="1400" u="none" strike="noStrike">
-                          <a:effectLst/>
-                        </a:rPr>
-                        <a:t>26</a:t>
-                      </a:r>
-                      <a:endParaRPr lang="en-US" sz="1400" b="0" i="0" u="none" strike="noStrike">
-                        <a:solidFill>
-                          <a:srgbClr val="000000"/>
-                        </a:solidFill>
-                        <a:effectLst/>
-                        <a:latin typeface="Calibri"/>
-                      </a:endParaRPr>
-                    </a:p>
-                  </a:txBody>
-                  <a:tcPr marL="7620" marR="7620" marT="7620" marB="0" anchor="b"/>
-                </a:tc>
-                <a:tc>
-                  <a:txBody>
-                    <a:bodyPr/>
-                    <a:lstStyle/>
-                    <a:p>
-                      <a:pPr algn="ctr" fontAlgn="b"/>
-                      <a:r>
-                        <a:rPr lang="en-US" sz="1400" u="none" strike="noStrike" dirty="0">
-                          <a:effectLst/>
-                        </a:rPr>
-                        <a:t>Linear Regression</a:t>
-                      </a:r>
-                      <a:endParaRPr lang="en-US" sz="1400" b="0" i="0" u="none" strike="noStrike" dirty="0">
-                        <a:solidFill>
-                          <a:srgbClr val="000000"/>
-                        </a:solidFill>
-                        <a:effectLst/>
-                        <a:latin typeface="Calibri"/>
-                      </a:endParaRPr>
-                    </a:p>
-                  </a:txBody>
-                  <a:tcPr marL="7620" marR="7620" marT="7620" marB="0" anchor="b"/>
-                </a:tc>
-                <a:tc>
-                  <a:txBody>
-                    <a:bodyPr/>
-                    <a:lstStyle/>
-                    <a:p>
-                      <a:pPr algn="r" fontAlgn="b"/>
-                      <a:r>
-                        <a:rPr lang="en-US" sz="1400" u="none" strike="noStrike" dirty="0">
-                          <a:effectLst/>
-                        </a:rPr>
-                        <a:t>0.496</a:t>
-                      </a:r>
-                      <a:endParaRPr lang="en-US" sz="1400" b="0" i="0" u="none" strike="noStrike" dirty="0">
-                        <a:solidFill>
-                          <a:srgbClr val="000000"/>
-                        </a:solidFill>
-                        <a:effectLst/>
-                        <a:latin typeface="Calibri"/>
-                      </a:endParaRPr>
-                    </a:p>
-                  </a:txBody>
-                  <a:tcPr marL="7620" marR="7620" marT="7620" marB="0" anchor="b"/>
-                </a:tc>
-                <a:tc>
-                  <a:txBody>
-                    <a:bodyPr/>
-                    <a:lstStyle/>
-                    <a:p>
-                      <a:pPr algn="r" fontAlgn="b"/>
-                      <a:r>
-                        <a:rPr lang="en-US" sz="1400" u="none" strike="noStrike" dirty="0" smtClean="0">
-                          <a:effectLst/>
-                        </a:rPr>
-                        <a:t>65.91 </a:t>
-                      </a:r>
-                      <a:endParaRPr lang="en-US" sz="1400" b="0" i="0" u="none" strike="noStrike" dirty="0">
-                        <a:solidFill>
-                          <a:srgbClr val="000000"/>
-                        </a:solidFill>
-                        <a:effectLst/>
-                        <a:latin typeface="Calibri"/>
-                      </a:endParaRPr>
-                    </a:p>
-                  </a:txBody>
-                  <a:tcPr marL="7620" marR="7620" marT="7620" marB="0" anchor="b"/>
-                </a:tc>
-              </a:tr>
-              <a:tr h="319088">
-                <a:tc>
-                  <a:txBody>
-                    <a:bodyPr/>
-                    <a:lstStyle/>
-                    <a:p>
-                      <a:pPr algn="r" fontAlgn="b"/>
-                      <a:r>
-                        <a:rPr lang="en-US" sz="1400" u="none" strike="noStrike">
-                          <a:effectLst/>
-                        </a:rPr>
-                        <a:t>29</a:t>
-                      </a:r>
-                      <a:endParaRPr lang="en-US" sz="1400" b="0" i="0" u="none" strike="noStrike">
-                        <a:solidFill>
-                          <a:srgbClr val="000000"/>
-                        </a:solidFill>
-                        <a:effectLst/>
-                        <a:latin typeface="Calibri"/>
-                      </a:endParaRPr>
-                    </a:p>
-                  </a:txBody>
-                  <a:tcPr marL="7620" marR="7620" marT="7620" marB="0" anchor="b"/>
-                </a:tc>
-                <a:tc>
-                  <a:txBody>
-                    <a:bodyPr/>
-                    <a:lstStyle/>
-                    <a:p>
-                      <a:pPr algn="ctr" fontAlgn="b"/>
-                      <a:r>
-                        <a:rPr lang="en-US" sz="1400" u="none" strike="noStrike" dirty="0">
-                          <a:effectLst/>
-                        </a:rPr>
-                        <a:t>Random Forest (2000)</a:t>
-                      </a:r>
-                      <a:endParaRPr lang="en-US" sz="1400" b="0" i="0" u="none" strike="noStrike" dirty="0">
-                        <a:solidFill>
-                          <a:srgbClr val="000000"/>
-                        </a:solidFill>
-                        <a:effectLst/>
-                        <a:latin typeface="Calibri"/>
-                      </a:endParaRPr>
-                    </a:p>
-                  </a:txBody>
-                  <a:tcPr marL="7620" marR="7620" marT="7620" marB="0" anchor="b"/>
-                </a:tc>
-                <a:tc>
-                  <a:txBody>
-                    <a:bodyPr/>
-                    <a:lstStyle/>
-                    <a:p>
-                      <a:pPr algn="r" fontAlgn="b"/>
-                      <a:r>
-                        <a:rPr lang="en-US" sz="1400" u="none" strike="noStrike" dirty="0">
-                          <a:effectLst/>
-                        </a:rPr>
-                        <a:t>0.482</a:t>
-                      </a:r>
-                      <a:endParaRPr lang="en-US" sz="1400" b="0" i="0" u="none" strike="noStrike" dirty="0">
-                        <a:solidFill>
-                          <a:srgbClr val="000000"/>
-                        </a:solidFill>
-                        <a:effectLst/>
-                        <a:latin typeface="Calibri"/>
-                      </a:endParaRPr>
-                    </a:p>
-                  </a:txBody>
-                  <a:tcPr marL="7620" marR="7620" marT="7620" marB="0" anchor="b"/>
-                </a:tc>
-                <a:tc>
-                  <a:txBody>
-                    <a:bodyPr/>
-                    <a:lstStyle/>
-                    <a:p>
-                      <a:pPr algn="r" fontAlgn="b"/>
-                      <a:r>
-                        <a:rPr lang="en-US" sz="1400" u="none" strike="noStrike" dirty="0" smtClean="0">
-                          <a:effectLst/>
-                        </a:rPr>
-                        <a:t>66.82 </a:t>
-                      </a:r>
-                      <a:endParaRPr lang="en-US" sz="1400" b="0" i="0" u="none" strike="noStrike" dirty="0">
-                        <a:solidFill>
-                          <a:srgbClr val="000000"/>
-                        </a:solidFill>
-                        <a:effectLst/>
-                        <a:latin typeface="Calibri"/>
-                      </a:endParaRPr>
-                    </a:p>
-                  </a:txBody>
-                  <a:tcPr marL="7620" marR="7620" marT="7620" marB="0" anchor="b"/>
-                </a:tc>
-              </a:tr>
-              <a:tr h="319088">
-                <a:tc>
-                  <a:txBody>
-                    <a:bodyPr/>
-                    <a:lstStyle/>
-                    <a:p>
-                      <a:pPr algn="r" fontAlgn="b"/>
-                      <a:r>
-                        <a:rPr lang="en-US" sz="1400" u="none" strike="noStrike">
-                          <a:effectLst/>
-                        </a:rPr>
-                        <a:t>31</a:t>
-                      </a:r>
-                      <a:endParaRPr lang="en-US" sz="1400" b="0" i="0" u="none" strike="noStrike">
-                        <a:solidFill>
-                          <a:srgbClr val="000000"/>
-                        </a:solidFill>
-                        <a:effectLst/>
-                        <a:latin typeface="Calibri"/>
-                      </a:endParaRPr>
-                    </a:p>
-                  </a:txBody>
-                  <a:tcPr marL="7620" marR="7620" marT="7620" marB="0" anchor="b"/>
-                </a:tc>
-                <a:tc>
-                  <a:txBody>
-                    <a:bodyPr/>
-                    <a:lstStyle/>
-                    <a:p>
-                      <a:pPr algn="ctr" fontAlgn="b"/>
-                      <a:r>
-                        <a:rPr lang="en-US" sz="1400" u="none" strike="noStrike" dirty="0">
-                          <a:effectLst/>
-                        </a:rPr>
-                        <a:t>Random Forest (2000)</a:t>
-                      </a:r>
-                      <a:endParaRPr lang="en-US" sz="1400" b="0" i="0" u="none" strike="noStrike" dirty="0">
-                        <a:solidFill>
-                          <a:srgbClr val="000000"/>
-                        </a:solidFill>
-                        <a:effectLst/>
-                        <a:latin typeface="Calibri"/>
-                      </a:endParaRPr>
-                    </a:p>
-                  </a:txBody>
-                  <a:tcPr marL="7620" marR="7620" marT="7620" marB="0" anchor="b"/>
-                </a:tc>
-                <a:tc>
-                  <a:txBody>
-                    <a:bodyPr/>
-                    <a:lstStyle/>
-                    <a:p>
-                      <a:pPr algn="r" fontAlgn="b"/>
-                      <a:r>
-                        <a:rPr lang="en-US" sz="1400" u="none" strike="noStrike" dirty="0">
-                          <a:effectLst/>
-                        </a:rPr>
-                        <a:t>0.472</a:t>
-                      </a:r>
-                      <a:endParaRPr lang="en-US" sz="1400" b="0" i="0" u="none" strike="noStrike" dirty="0">
-                        <a:solidFill>
-                          <a:srgbClr val="000000"/>
-                        </a:solidFill>
-                        <a:effectLst/>
-                        <a:latin typeface="Calibri"/>
-                      </a:endParaRPr>
-                    </a:p>
-                  </a:txBody>
-                  <a:tcPr marL="7620" marR="7620" marT="7620" marB="0" anchor="b"/>
-                </a:tc>
-                <a:tc>
-                  <a:txBody>
-                    <a:bodyPr/>
-                    <a:lstStyle/>
-                    <a:p>
-                      <a:pPr algn="r" fontAlgn="b"/>
-                      <a:r>
-                        <a:rPr lang="en-US" sz="1400" u="none" strike="noStrike" dirty="0" smtClean="0">
-                          <a:effectLst/>
-                        </a:rPr>
-                        <a:t>71.20 </a:t>
-                      </a:r>
-                      <a:endParaRPr lang="en-US" sz="1400" b="0" i="0" u="none" strike="noStrike" dirty="0">
-                        <a:solidFill>
-                          <a:srgbClr val="000000"/>
-                        </a:solidFill>
-                        <a:effectLst/>
-                        <a:latin typeface="Calibri"/>
-                      </a:endParaRPr>
-                    </a:p>
-                  </a:txBody>
-                  <a:tcPr marL="7620" marR="7620" marT="7620" marB="0" anchor="b"/>
-                </a:tc>
-              </a:tr>
-              <a:tr h="319088">
-                <a:tc>
-                  <a:txBody>
-                    <a:bodyPr/>
-                    <a:lstStyle/>
-                    <a:p>
-                      <a:pPr algn="r" fontAlgn="b"/>
-                      <a:r>
-                        <a:rPr lang="en-US" sz="1400" u="none" strike="noStrike">
-                          <a:effectLst/>
-                        </a:rPr>
-                        <a:t>30</a:t>
-                      </a:r>
-                      <a:endParaRPr lang="en-US" sz="1400" b="0" i="0" u="none" strike="noStrike">
-                        <a:solidFill>
-                          <a:srgbClr val="000000"/>
-                        </a:solidFill>
-                        <a:effectLst/>
-                        <a:latin typeface="Calibri"/>
-                      </a:endParaRPr>
-                    </a:p>
-                  </a:txBody>
-                  <a:tcPr marL="7620" marR="7620" marT="7620" marB="0" anchor="b"/>
-                </a:tc>
-                <a:tc>
-                  <a:txBody>
-                    <a:bodyPr/>
-                    <a:lstStyle/>
-                    <a:p>
-                      <a:pPr algn="ctr" fontAlgn="b"/>
-                      <a:r>
-                        <a:rPr lang="en-US" sz="1400" u="none" strike="noStrike" dirty="0">
-                          <a:effectLst/>
-                        </a:rPr>
-                        <a:t>Linear Regression</a:t>
-                      </a:r>
-                      <a:endParaRPr lang="en-US" sz="1400" b="0" i="0" u="none" strike="noStrike" dirty="0">
-                        <a:solidFill>
-                          <a:srgbClr val="000000"/>
-                        </a:solidFill>
-                        <a:effectLst/>
-                        <a:latin typeface="Calibri"/>
-                      </a:endParaRPr>
-                    </a:p>
-                  </a:txBody>
-                  <a:tcPr marL="7620" marR="7620" marT="7620" marB="0" anchor="b"/>
-                </a:tc>
-                <a:tc>
-                  <a:txBody>
-                    <a:bodyPr/>
-                    <a:lstStyle/>
-                    <a:p>
-                      <a:pPr algn="r" fontAlgn="b"/>
-                      <a:r>
-                        <a:rPr lang="en-US" sz="1400" u="none" strike="noStrike" dirty="0">
-                          <a:effectLst/>
-                        </a:rPr>
-                        <a:t>0.448</a:t>
-                      </a:r>
-                      <a:endParaRPr lang="en-US" sz="1400" b="0" i="0" u="none" strike="noStrike" dirty="0">
-                        <a:solidFill>
-                          <a:srgbClr val="000000"/>
-                        </a:solidFill>
-                        <a:effectLst/>
-                        <a:latin typeface="Calibri"/>
-                      </a:endParaRPr>
-                    </a:p>
-                  </a:txBody>
-                  <a:tcPr marL="7620" marR="7620" marT="7620" marB="0" anchor="b"/>
-                </a:tc>
-                <a:tc>
-                  <a:txBody>
-                    <a:bodyPr/>
-                    <a:lstStyle/>
-                    <a:p>
-                      <a:pPr algn="r" fontAlgn="b"/>
-                      <a:r>
-                        <a:rPr lang="en-US" sz="1400" u="none" strike="noStrike" dirty="0" smtClean="0">
-                          <a:effectLst/>
-                        </a:rPr>
-                        <a:t>72.83 </a:t>
-                      </a:r>
-                      <a:endParaRPr lang="en-US" sz="1400" b="0" i="0" u="none" strike="noStrike" dirty="0">
-                        <a:solidFill>
-                          <a:srgbClr val="000000"/>
-                        </a:solidFill>
-                        <a:effectLst/>
-                        <a:latin typeface="Calibri"/>
-                      </a:endParaRPr>
-                    </a:p>
-                  </a:txBody>
-                  <a:tcPr marL="7620" marR="7620" marT="7620" marB="0" anchor="b"/>
-                </a:tc>
-              </a:tr>
-              <a:tr h="319088">
-                <a:tc>
-                  <a:txBody>
-                    <a:bodyPr/>
-                    <a:lstStyle/>
-                    <a:p>
-                      <a:pPr algn="r" fontAlgn="b"/>
-                      <a:r>
-                        <a:rPr lang="en-US" sz="1400" b="0" i="0" u="none" strike="noStrike" dirty="0" smtClean="0">
+                        <a:rPr lang="en-US" sz="1400" u="none" strike="noStrike" kern="1200" dirty="0" smtClean="0">
                           <a:solidFill>
-                            <a:srgbClr val="000000"/>
+                            <a:schemeClr val="dk1"/>
                           </a:solidFill>
                           <a:effectLst/>
-                          <a:latin typeface="Calibri"/>
-                        </a:rPr>
-                        <a:t>1</a:t>
-                      </a:r>
-                      <a:endParaRPr lang="en-US" sz="1400" b="0" i="0" u="none" strike="noStrike" dirty="0">
-                        <a:solidFill>
-                          <a:srgbClr val="000000"/>
-                        </a:solidFill>
-                        <a:effectLst/>
-                        <a:latin typeface="Calibri"/>
-                      </a:endParaRPr>
-                    </a:p>
-                  </a:txBody>
-                  <a:tcPr marL="7620" marR="7620" marT="7620" marB="0" anchor="b"/>
-                </a:tc>
-                <a:tc>
-                  <a:txBody>
-                    <a:bodyPr/>
-                    <a:lstStyle/>
-                    <a:p>
-                      <a:pPr algn="ctr" fontAlgn="b"/>
-                      <a:r>
-                        <a:rPr lang="en-US" sz="1400" u="none" strike="noStrike" dirty="0">
-                          <a:effectLst/>
-                        </a:rPr>
-                        <a:t>Linear Regression</a:t>
-                      </a:r>
-                      <a:endParaRPr lang="en-US" sz="1400" b="0" i="0" u="none" strike="noStrike" dirty="0">
-                        <a:solidFill>
-                          <a:srgbClr val="000000"/>
-                        </a:solidFill>
-                        <a:effectLst/>
-                        <a:latin typeface="Calibri"/>
-                      </a:endParaRPr>
-                    </a:p>
-                  </a:txBody>
-                  <a:tcPr marL="7620" marR="7620" marT="7620" marB="0" anchor="b"/>
-                </a:tc>
-                <a:tc>
-                  <a:txBody>
-                    <a:bodyPr/>
-                    <a:lstStyle/>
-                    <a:p>
-                      <a:pPr algn="r" fontAlgn="b"/>
-                      <a:r>
-                        <a:rPr lang="en-US" sz="1400" u="none" strike="noStrike" dirty="0">
-                          <a:effectLst/>
-                        </a:rPr>
-                        <a:t>0.326</a:t>
-                      </a:r>
-                      <a:endParaRPr lang="en-US" sz="1400" b="0" i="0" u="none" strike="noStrike" dirty="0">
-                        <a:solidFill>
-                          <a:srgbClr val="000000"/>
-                        </a:solidFill>
-                        <a:effectLst/>
-                        <a:latin typeface="Calibri"/>
-                      </a:endParaRPr>
-                    </a:p>
-                  </a:txBody>
-                  <a:tcPr marL="7620" marR="7620" marT="7620" marB="0" anchor="b"/>
-                </a:tc>
-                <a:tc>
-                  <a:txBody>
-                    <a:bodyPr/>
-                    <a:lstStyle/>
-                    <a:p>
-                      <a:pPr algn="r" fontAlgn="b"/>
-                      <a:r>
-                        <a:rPr lang="en-US" sz="1400" u="none" strike="noStrike" dirty="0" smtClean="0">
-                          <a:effectLst/>
+                          <a:latin typeface="+mn-lt"/>
+                          <a:ea typeface="+mn-ea"/>
+                          <a:cs typeface="+mn-cs"/>
                         </a:rPr>
                         <a:t>134.65 </a:t>
                       </a:r>
-                      <a:endParaRPr lang="en-US" sz="1400" b="0" i="0" u="none" strike="noStrike" dirty="0">
+                      <a:endParaRPr lang="en-US" sz="1400" u="none" strike="noStrike" kern="1200" dirty="0">
                         <a:solidFill>
-                          <a:srgbClr val="000000"/>
+                          <a:schemeClr val="dk1"/>
                         </a:solidFill>
                         <a:effectLst/>
-                        <a:latin typeface="Calibri"/>
+                        <a:latin typeface="+mn-lt"/>
+                        <a:ea typeface="+mn-ea"/>
+                        <a:cs typeface="+mn-cs"/>
                       </a:endParaRPr>
                     </a:p>
                   </a:txBody>

</xml_diff>